<commit_message>
added new latex files
</commit_message>
<xml_diff>
--- a/images/framework_architecture.pptx
+++ b/images/framework_architecture.pptx
@@ -5,7 +5,7 @@
     <p:sldMasterId id="2147483660" r:id="rId1"/>
   </p:sldMasterIdLst>
   <p:sldIdLst>
-    <p:sldId id="257" r:id="rId2"/>
+    <p:sldId id="258" r:id="rId2"/>
   </p:sldIdLst>
   <p:sldSz cx="12192000" cy="6858000"/>
   <p:notesSz cx="6858000" cy="9144000"/>
@@ -876,6 +876,94 @@
     </pc:docChg>
   </pc:docChgLst>
   <pc:docChgLst>
+    <pc:chgData name="La, Trung Kien" userId="S::uas0015624@stud.fra-uas.de::a9b9c998-5aab-4e89-af6d-d527f5f74042" providerId="AD" clId="Web-{91896C77-A238-BDD0-3080-9753DCF1E304}"/>
+    <pc:docChg chg="modSld">
+      <pc:chgData name="La, Trung Kien" userId="S::uas0015624@stud.fra-uas.de::a9b9c998-5aab-4e89-af6d-d527f5f74042" providerId="AD" clId="Web-{91896C77-A238-BDD0-3080-9753DCF1E304}" dt="2025-08-23T10:46:08.723" v="93" actId="1076"/>
+      <pc:docMkLst>
+        <pc:docMk/>
+      </pc:docMkLst>
+      <pc:sldChg chg="addSp delSp modSp">
+        <pc:chgData name="La, Trung Kien" userId="S::uas0015624@stud.fra-uas.de::a9b9c998-5aab-4e89-af6d-d527f5f74042" providerId="AD" clId="Web-{91896C77-A238-BDD0-3080-9753DCF1E304}" dt="2025-08-23T10:46:08.723" v="93" actId="1076"/>
+        <pc:sldMkLst>
+          <pc:docMk/>
+          <pc:sldMk cId="123882738" sldId="257"/>
+        </pc:sldMkLst>
+        <pc:spChg chg="add mod">
+          <ac:chgData name="La, Trung Kien" userId="S::uas0015624@stud.fra-uas.de::a9b9c998-5aab-4e89-af6d-d527f5f74042" providerId="AD" clId="Web-{91896C77-A238-BDD0-3080-9753DCF1E304}" dt="2025-08-23T10:44:20.664" v="89" actId="1076"/>
+          <ac:spMkLst>
+            <pc:docMk/>
+            <pc:sldMk cId="123882738" sldId="257"/>
+            <ac:spMk id="12" creationId="{7CD8BBE4-3030-9C59-DB6D-927D7DF6C540}"/>
+          </ac:spMkLst>
+        </pc:spChg>
+        <pc:spChg chg="add mod">
+          <ac:chgData name="La, Trung Kien" userId="S::uas0015624@stud.fra-uas.de::a9b9c998-5aab-4e89-af6d-d527f5f74042" providerId="AD" clId="Web-{91896C77-A238-BDD0-3080-9753DCF1E304}" dt="2025-08-23T10:36:38.067" v="57" actId="20577"/>
+          <ac:spMkLst>
+            <pc:docMk/>
+            <pc:sldMk cId="123882738" sldId="257"/>
+            <ac:spMk id="13" creationId="{EE2E90EC-D814-7761-E80D-FFD9095DBDA8}"/>
+          </ac:spMkLst>
+        </pc:spChg>
+        <pc:spChg chg="mod">
+          <ac:chgData name="La, Trung Kien" userId="S::uas0015624@stud.fra-uas.de::a9b9c998-5aab-4e89-af6d-d527f5f74042" providerId="AD" clId="Web-{91896C77-A238-BDD0-3080-9753DCF1E304}" dt="2025-08-23T10:46:08.723" v="93" actId="1076"/>
+          <ac:spMkLst>
+            <pc:docMk/>
+            <pc:sldMk cId="123882738" sldId="257"/>
+            <ac:spMk id="89" creationId="{7CC47AA3-C404-D285-27D1-8CF8B1ECE79E}"/>
+          </ac:spMkLst>
+        </pc:spChg>
+        <pc:picChg chg="add mod">
+          <ac:chgData name="La, Trung Kien" userId="S::uas0015624@stud.fra-uas.de::a9b9c998-5aab-4e89-af6d-d527f5f74042" providerId="AD" clId="Web-{91896C77-A238-BDD0-3080-9753DCF1E304}" dt="2025-08-23T10:44:24.086" v="90" actId="1076"/>
+          <ac:picMkLst>
+            <pc:docMk/>
+            <pc:sldMk cId="123882738" sldId="257"/>
+            <ac:picMk id="6" creationId="{09FB18A4-6616-59DC-4E4C-5FA4FC7572D2}"/>
+          </ac:picMkLst>
+        </pc:picChg>
+        <pc:picChg chg="add mod">
+          <ac:chgData name="La, Trung Kien" userId="S::uas0015624@stud.fra-uas.de::a9b9c998-5aab-4e89-af6d-d527f5f74042" providerId="AD" clId="Web-{91896C77-A238-BDD0-3080-9753DCF1E304}" dt="2025-08-23T10:43:19.678" v="84" actId="1076"/>
+          <ac:picMkLst>
+            <pc:docMk/>
+            <pc:sldMk cId="123882738" sldId="257"/>
+            <ac:picMk id="8" creationId="{A7FC7613-B39A-D4E2-D008-D9B2BA9F1180}"/>
+          </ac:picMkLst>
+        </pc:picChg>
+        <pc:picChg chg="mod">
+          <ac:chgData name="La, Trung Kien" userId="S::uas0015624@stud.fra-uas.de::a9b9c998-5aab-4e89-af6d-d527f5f74042" providerId="AD" clId="Web-{91896C77-A238-BDD0-3080-9753DCF1E304}" dt="2025-08-23T10:46:04.551" v="92" actId="1076"/>
+          <ac:picMkLst>
+            <pc:docMk/>
+            <pc:sldMk cId="123882738" sldId="257"/>
+            <ac:picMk id="14" creationId="{79F503FB-4A52-1A9F-6CC9-C79CBBD9BF32}"/>
+          </ac:picMkLst>
+        </pc:picChg>
+        <pc:cxnChg chg="add mod">
+          <ac:chgData name="La, Trung Kien" userId="S::uas0015624@stud.fra-uas.de::a9b9c998-5aab-4e89-af6d-d527f5f74042" providerId="AD" clId="Web-{91896C77-A238-BDD0-3080-9753DCF1E304}" dt="2025-08-23T10:43:15.302" v="83" actId="1076"/>
+          <ac:cxnSpMkLst>
+            <pc:docMk/>
+            <pc:sldMk cId="123882738" sldId="257"/>
+            <ac:cxnSpMk id="15" creationId="{441606DD-962A-FD99-4A85-3A9F5D2C9272}"/>
+          </ac:cxnSpMkLst>
+        </pc:cxnChg>
+        <pc:cxnChg chg="add mod">
+          <ac:chgData name="La, Trung Kien" userId="S::uas0015624@stud.fra-uas.de::a9b9c998-5aab-4e89-af6d-d527f5f74042" providerId="AD" clId="Web-{91896C77-A238-BDD0-3080-9753DCF1E304}" dt="2025-08-23T10:44:52.478" v="91"/>
+          <ac:cxnSpMkLst>
+            <pc:docMk/>
+            <pc:sldMk cId="123882738" sldId="257"/>
+            <ac:cxnSpMk id="16" creationId="{8E5FDF2C-F02B-0725-BC14-310C5294E335}"/>
+          </ac:cxnSpMkLst>
+        </pc:cxnChg>
+        <pc:cxnChg chg="mod">
+          <ac:chgData name="La, Trung Kien" userId="S::uas0015624@stud.fra-uas.de::a9b9c998-5aab-4e89-af6d-d527f5f74042" providerId="AD" clId="Web-{91896C77-A238-BDD0-3080-9753DCF1E304}" dt="2025-08-23T10:42:37.926" v="81" actId="14100"/>
+          <ac:cxnSpMkLst>
+            <pc:docMk/>
+            <pc:sldMk cId="123882738" sldId="257"/>
+            <ac:cxnSpMk id="59" creationId="{E7E6883C-DB3C-E1BF-D382-C44673D5E39C}"/>
+          </ac:cxnSpMkLst>
+        </pc:cxnChg>
+      </pc:sldChg>
+    </pc:docChg>
+  </pc:docChgLst>
+  <pc:docChgLst>
     <pc:chgData name="La, Trung Kien" userId="S::uas0015624@stud.fra-uas.de::a9b9c998-5aab-4e89-af6d-d527f5f74042" providerId="AD" clId="Web-{F33CC7AB-E154-C95B-89F4-AFE146238E40}"/>
     <pc:docChg chg="modSld">
       <pc:chgData name="La, Trung Kien" userId="S::uas0015624@stud.fra-uas.de::a9b9c998-5aab-4e89-af6d-d527f5f74042" providerId="AD" clId="Web-{F33CC7AB-E154-C95B-89F4-AFE146238E40}" dt="2025-08-20T15:56:28.065" v="65" actId="20577"/>
@@ -1006,94 +1094,6 @@
             <pc:docMk/>
             <pc:sldMk cId="123882738" sldId="257"/>
             <ac:cxnSpMk id="98" creationId="{E683F014-C597-0053-DA33-FCC2CC2B63EC}"/>
-          </ac:cxnSpMkLst>
-        </pc:cxnChg>
-      </pc:sldChg>
-    </pc:docChg>
-  </pc:docChgLst>
-  <pc:docChgLst>
-    <pc:chgData name="La, Trung Kien" userId="S::uas0015624@stud.fra-uas.de::a9b9c998-5aab-4e89-af6d-d527f5f74042" providerId="AD" clId="Web-{91896C77-A238-BDD0-3080-9753DCF1E304}"/>
-    <pc:docChg chg="modSld">
-      <pc:chgData name="La, Trung Kien" userId="S::uas0015624@stud.fra-uas.de::a9b9c998-5aab-4e89-af6d-d527f5f74042" providerId="AD" clId="Web-{91896C77-A238-BDD0-3080-9753DCF1E304}" dt="2025-08-23T10:46:08.723" v="93" actId="1076"/>
-      <pc:docMkLst>
-        <pc:docMk/>
-      </pc:docMkLst>
-      <pc:sldChg chg="addSp delSp modSp">
-        <pc:chgData name="La, Trung Kien" userId="S::uas0015624@stud.fra-uas.de::a9b9c998-5aab-4e89-af6d-d527f5f74042" providerId="AD" clId="Web-{91896C77-A238-BDD0-3080-9753DCF1E304}" dt="2025-08-23T10:46:08.723" v="93" actId="1076"/>
-        <pc:sldMkLst>
-          <pc:docMk/>
-          <pc:sldMk cId="123882738" sldId="257"/>
-        </pc:sldMkLst>
-        <pc:spChg chg="add mod">
-          <ac:chgData name="La, Trung Kien" userId="S::uas0015624@stud.fra-uas.de::a9b9c998-5aab-4e89-af6d-d527f5f74042" providerId="AD" clId="Web-{91896C77-A238-BDD0-3080-9753DCF1E304}" dt="2025-08-23T10:44:20.664" v="89" actId="1076"/>
-          <ac:spMkLst>
-            <pc:docMk/>
-            <pc:sldMk cId="123882738" sldId="257"/>
-            <ac:spMk id="12" creationId="{7CD8BBE4-3030-9C59-DB6D-927D7DF6C540}"/>
-          </ac:spMkLst>
-        </pc:spChg>
-        <pc:spChg chg="add mod">
-          <ac:chgData name="La, Trung Kien" userId="S::uas0015624@stud.fra-uas.de::a9b9c998-5aab-4e89-af6d-d527f5f74042" providerId="AD" clId="Web-{91896C77-A238-BDD0-3080-9753DCF1E304}" dt="2025-08-23T10:36:38.067" v="57" actId="20577"/>
-          <ac:spMkLst>
-            <pc:docMk/>
-            <pc:sldMk cId="123882738" sldId="257"/>
-            <ac:spMk id="13" creationId="{EE2E90EC-D814-7761-E80D-FFD9095DBDA8}"/>
-          </ac:spMkLst>
-        </pc:spChg>
-        <pc:spChg chg="mod">
-          <ac:chgData name="La, Trung Kien" userId="S::uas0015624@stud.fra-uas.de::a9b9c998-5aab-4e89-af6d-d527f5f74042" providerId="AD" clId="Web-{91896C77-A238-BDD0-3080-9753DCF1E304}" dt="2025-08-23T10:46:08.723" v="93" actId="1076"/>
-          <ac:spMkLst>
-            <pc:docMk/>
-            <pc:sldMk cId="123882738" sldId="257"/>
-            <ac:spMk id="89" creationId="{7CC47AA3-C404-D285-27D1-8CF8B1ECE79E}"/>
-          </ac:spMkLst>
-        </pc:spChg>
-        <pc:picChg chg="add mod">
-          <ac:chgData name="La, Trung Kien" userId="S::uas0015624@stud.fra-uas.de::a9b9c998-5aab-4e89-af6d-d527f5f74042" providerId="AD" clId="Web-{91896C77-A238-BDD0-3080-9753DCF1E304}" dt="2025-08-23T10:44:24.086" v="90" actId="1076"/>
-          <ac:picMkLst>
-            <pc:docMk/>
-            <pc:sldMk cId="123882738" sldId="257"/>
-            <ac:picMk id="6" creationId="{09FB18A4-6616-59DC-4E4C-5FA4FC7572D2}"/>
-          </ac:picMkLst>
-        </pc:picChg>
-        <pc:picChg chg="add mod">
-          <ac:chgData name="La, Trung Kien" userId="S::uas0015624@stud.fra-uas.de::a9b9c998-5aab-4e89-af6d-d527f5f74042" providerId="AD" clId="Web-{91896C77-A238-BDD0-3080-9753DCF1E304}" dt="2025-08-23T10:43:19.678" v="84" actId="1076"/>
-          <ac:picMkLst>
-            <pc:docMk/>
-            <pc:sldMk cId="123882738" sldId="257"/>
-            <ac:picMk id="8" creationId="{A7FC7613-B39A-D4E2-D008-D9B2BA9F1180}"/>
-          </ac:picMkLst>
-        </pc:picChg>
-        <pc:picChg chg="mod">
-          <ac:chgData name="La, Trung Kien" userId="S::uas0015624@stud.fra-uas.de::a9b9c998-5aab-4e89-af6d-d527f5f74042" providerId="AD" clId="Web-{91896C77-A238-BDD0-3080-9753DCF1E304}" dt="2025-08-23T10:46:04.551" v="92" actId="1076"/>
-          <ac:picMkLst>
-            <pc:docMk/>
-            <pc:sldMk cId="123882738" sldId="257"/>
-            <ac:picMk id="14" creationId="{79F503FB-4A52-1A9F-6CC9-C79CBBD9BF32}"/>
-          </ac:picMkLst>
-        </pc:picChg>
-        <pc:cxnChg chg="add mod">
-          <ac:chgData name="La, Trung Kien" userId="S::uas0015624@stud.fra-uas.de::a9b9c998-5aab-4e89-af6d-d527f5f74042" providerId="AD" clId="Web-{91896C77-A238-BDD0-3080-9753DCF1E304}" dt="2025-08-23T10:43:15.302" v="83" actId="1076"/>
-          <ac:cxnSpMkLst>
-            <pc:docMk/>
-            <pc:sldMk cId="123882738" sldId="257"/>
-            <ac:cxnSpMk id="15" creationId="{441606DD-962A-FD99-4A85-3A9F5D2C9272}"/>
-          </ac:cxnSpMkLst>
-        </pc:cxnChg>
-        <pc:cxnChg chg="add mod">
-          <ac:chgData name="La, Trung Kien" userId="S::uas0015624@stud.fra-uas.de::a9b9c998-5aab-4e89-af6d-d527f5f74042" providerId="AD" clId="Web-{91896C77-A238-BDD0-3080-9753DCF1E304}" dt="2025-08-23T10:44:52.478" v="91"/>
-          <ac:cxnSpMkLst>
-            <pc:docMk/>
-            <pc:sldMk cId="123882738" sldId="257"/>
-            <ac:cxnSpMk id="16" creationId="{8E5FDF2C-F02B-0725-BC14-310C5294E335}"/>
-          </ac:cxnSpMkLst>
-        </pc:cxnChg>
-        <pc:cxnChg chg="mod">
-          <ac:chgData name="La, Trung Kien" userId="S::uas0015624@stud.fra-uas.de::a9b9c998-5aab-4e89-af6d-d527f5f74042" providerId="AD" clId="Web-{91896C77-A238-BDD0-3080-9753DCF1E304}" dt="2025-08-23T10:42:37.926" v="81" actId="14100"/>
-          <ac:cxnSpMkLst>
-            <pc:docMk/>
-            <pc:sldMk cId="123882738" sldId="257"/>
-            <ac:cxnSpMk id="59" creationId="{E7E6883C-DB3C-E1BF-D382-C44673D5E39C}"/>
           </ac:cxnSpMkLst>
         </pc:cxnChg>
       </pc:sldChg>
@@ -1231,7 +1231,7 @@
           <a:p>
             <a:fld id="{846CE7D5-CF57-46EF-B807-FDD0502418D4}" type="datetimeFigureOut">
               <a:rPr lang="en-US" smtClean="0"/>
-              <a:t>11/19/2025</a:t>
+              <a:t>1/4/2026</a:t>
             </a:fld>
             <a:endParaRPr lang="en-US"/>
           </a:p>
@@ -1399,7 +1399,7 @@
           <a:p>
             <a:fld id="{846CE7D5-CF57-46EF-B807-FDD0502418D4}" type="datetimeFigureOut">
               <a:rPr lang="en-US" smtClean="0"/>
-              <a:t>11/19/2025</a:t>
+              <a:t>1/4/2026</a:t>
             </a:fld>
             <a:endParaRPr lang="en-US"/>
           </a:p>
@@ -1577,7 +1577,7 @@
           <a:p>
             <a:fld id="{846CE7D5-CF57-46EF-B807-FDD0502418D4}" type="datetimeFigureOut">
               <a:rPr lang="en-US" smtClean="0"/>
-              <a:t>11/19/2025</a:t>
+              <a:t>1/4/2026</a:t>
             </a:fld>
             <a:endParaRPr lang="en-US"/>
           </a:p>
@@ -1745,7 +1745,7 @@
           <a:p>
             <a:fld id="{846CE7D5-CF57-46EF-B807-FDD0502418D4}" type="datetimeFigureOut">
               <a:rPr lang="en-US" smtClean="0"/>
-              <a:t>11/19/2025</a:t>
+              <a:t>1/4/2026</a:t>
             </a:fld>
             <a:endParaRPr lang="en-US"/>
           </a:p>
@@ -1990,7 +1990,7 @@
           <a:p>
             <a:fld id="{846CE7D5-CF57-46EF-B807-FDD0502418D4}" type="datetimeFigureOut">
               <a:rPr lang="en-US" smtClean="0"/>
-              <a:t>11/19/2025</a:t>
+              <a:t>1/4/2026</a:t>
             </a:fld>
             <a:endParaRPr lang="en-US"/>
           </a:p>
@@ -2219,7 +2219,7 @@
           <a:p>
             <a:fld id="{846CE7D5-CF57-46EF-B807-FDD0502418D4}" type="datetimeFigureOut">
               <a:rPr lang="en-US" smtClean="0"/>
-              <a:t>11/19/2025</a:t>
+              <a:t>1/4/2026</a:t>
             </a:fld>
             <a:endParaRPr lang="en-US"/>
           </a:p>
@@ -2583,7 +2583,7 @@
           <a:p>
             <a:fld id="{846CE7D5-CF57-46EF-B807-FDD0502418D4}" type="datetimeFigureOut">
               <a:rPr lang="en-US" smtClean="0"/>
-              <a:t>11/19/2025</a:t>
+              <a:t>1/4/2026</a:t>
             </a:fld>
             <a:endParaRPr lang="en-US"/>
           </a:p>
@@ -2700,7 +2700,7 @@
           <a:p>
             <a:fld id="{846CE7D5-CF57-46EF-B807-FDD0502418D4}" type="datetimeFigureOut">
               <a:rPr lang="en-US" smtClean="0"/>
-              <a:t>11/19/2025</a:t>
+              <a:t>1/4/2026</a:t>
             </a:fld>
             <a:endParaRPr lang="en-US"/>
           </a:p>
@@ -2795,7 +2795,7 @@
           <a:p>
             <a:fld id="{846CE7D5-CF57-46EF-B807-FDD0502418D4}" type="datetimeFigureOut">
               <a:rPr lang="en-US" smtClean="0"/>
-              <a:t>11/19/2025</a:t>
+              <a:t>1/4/2026</a:t>
             </a:fld>
             <a:endParaRPr lang="en-US"/>
           </a:p>
@@ -3070,7 +3070,7 @@
           <a:p>
             <a:fld id="{846CE7D5-CF57-46EF-B807-FDD0502418D4}" type="datetimeFigureOut">
               <a:rPr lang="en-US" smtClean="0"/>
-              <a:t>11/19/2025</a:t>
+              <a:t>1/4/2026</a:t>
             </a:fld>
             <a:endParaRPr lang="en-US"/>
           </a:p>
@@ -3325,7 +3325,7 @@
           <a:p>
             <a:fld id="{846CE7D5-CF57-46EF-B807-FDD0502418D4}" type="datetimeFigureOut">
               <a:rPr lang="en-US" smtClean="0"/>
-              <a:t>11/19/2025</a:t>
+              <a:t>1/4/2026</a:t>
             </a:fld>
             <a:endParaRPr lang="en-US"/>
           </a:p>
@@ -3536,7 +3536,7 @@
           <a:p>
             <a:fld id="{846CE7D5-CF57-46EF-B807-FDD0502418D4}" type="datetimeFigureOut">
               <a:rPr lang="en-US" smtClean="0"/>
-              <a:t>11/19/2025</a:t>
+              <a:t>1/4/2026</a:t>
             </a:fld>
             <a:endParaRPr lang="en-US"/>
           </a:p>
@@ -3932,7 +3932,7 @@
         <p:cNvPr id="1" name="">
           <a:extLst>
             <a:ext uri="{FF2B5EF4-FFF2-40B4-BE49-F238E27FC236}">
-              <a16:creationId xmlns:a16="http://schemas.microsoft.com/office/drawing/2014/main" id="{E11AE8EB-BD6B-DA8B-4615-55AFD88E9658}"/>
+              <a16:creationId xmlns:a16="http://schemas.microsoft.com/office/drawing/2014/main" id="{09897204-F71A-4EDF-CC15-8B35E55AC71D}"/>
             </a:ext>
           </a:extLst>
         </p:cNvPr>
@@ -3947,150 +3947,12 @@
           <a:chExt cx="0" cy="0"/>
         </a:xfrm>
       </p:grpSpPr>
-      <p:pic>
-        <p:nvPicPr>
-          <p:cNvPr id="4" name="Picture 3" descr="A drawing of a machine&#10;&#10;AI-generated content may be incorrect.">
-            <a:extLst>
-              <a:ext uri="{FF2B5EF4-FFF2-40B4-BE49-F238E27FC236}">
-                <a16:creationId xmlns:a16="http://schemas.microsoft.com/office/drawing/2014/main" id="{AD83C555-DB44-EE36-DA58-02E53BA94F66}"/>
-              </a:ext>
-            </a:extLst>
-          </p:cNvPr>
-          <p:cNvPicPr>
-            <a:picLocks noChangeAspect="1"/>
-          </p:cNvPicPr>
-          <p:nvPr/>
-        </p:nvPicPr>
-        <p:blipFill>
-          <a:blip r:embed="rId2"/>
-          <a:stretch>
-            <a:fillRect/>
-          </a:stretch>
-        </p:blipFill>
-        <p:spPr>
-          <a:xfrm>
-            <a:off x="132676" y="1727187"/>
-            <a:ext cx="1937698" cy="1320710"/>
-          </a:xfrm>
-          <a:prstGeom prst="rect">
-            <a:avLst/>
-          </a:prstGeom>
-        </p:spPr>
-      </p:pic>
-      <p:pic>
-        <p:nvPicPr>
-          <p:cNvPr id="10" name="Graphic 9" descr="Laptop outline">
-            <a:extLst>
-              <a:ext uri="{FF2B5EF4-FFF2-40B4-BE49-F238E27FC236}">
-                <a16:creationId xmlns:a16="http://schemas.microsoft.com/office/drawing/2014/main" id="{3DAF9981-2796-E6C3-5B8C-9626D9C9C4E7}"/>
-              </a:ext>
-            </a:extLst>
-          </p:cNvPr>
-          <p:cNvPicPr>
-            <a:picLocks noChangeAspect="1"/>
-          </p:cNvPicPr>
-          <p:nvPr/>
-        </p:nvPicPr>
-        <p:blipFill>
-          <a:blip r:embed="rId3">
-            <a:extLst>
-              <a:ext uri="{96DAC541-7B7A-43D3-8B79-37D633B846F1}">
-                <asvg:svgBlip xmlns:asvg="http://schemas.microsoft.com/office/drawing/2016/SVG/main" r:embed="rId4"/>
-              </a:ext>
-            </a:extLst>
-          </a:blip>
-          <a:stretch>
-            <a:fillRect/>
-          </a:stretch>
-        </p:blipFill>
-        <p:spPr>
-          <a:xfrm>
-            <a:off x="1155974" y="23356"/>
-            <a:ext cx="914400" cy="914400"/>
-          </a:xfrm>
-          <a:prstGeom prst="rect">
-            <a:avLst/>
-          </a:prstGeom>
-        </p:spPr>
-      </p:pic>
-      <p:pic>
-        <p:nvPicPr>
-          <p:cNvPr id="11" name="Graphic 10" descr="Wireless router outline">
-            <a:extLst>
-              <a:ext uri="{FF2B5EF4-FFF2-40B4-BE49-F238E27FC236}">
-                <a16:creationId xmlns:a16="http://schemas.microsoft.com/office/drawing/2014/main" id="{AA310971-D5B1-B914-5F26-48099F63056E}"/>
-              </a:ext>
-            </a:extLst>
-          </p:cNvPr>
-          <p:cNvPicPr>
-            <a:picLocks noChangeAspect="1"/>
-          </p:cNvPicPr>
-          <p:nvPr/>
-        </p:nvPicPr>
-        <p:blipFill>
-          <a:blip r:embed="rId5">
-            <a:extLst>
-              <a:ext uri="{96DAC541-7B7A-43D3-8B79-37D633B846F1}">
-                <asvg:svgBlip xmlns:asvg="http://schemas.microsoft.com/office/drawing/2016/SVG/main" r:embed="rId6"/>
-              </a:ext>
-            </a:extLst>
-          </a:blip>
-          <a:stretch>
-            <a:fillRect/>
-          </a:stretch>
-        </p:blipFill>
-        <p:spPr>
-          <a:xfrm>
-            <a:off x="2080936" y="0"/>
-            <a:ext cx="914400" cy="914400"/>
-          </a:xfrm>
-          <a:prstGeom prst="rect">
-            <a:avLst/>
-          </a:prstGeom>
-        </p:spPr>
-      </p:pic>
-      <p:pic>
-        <p:nvPicPr>
-          <p:cNvPr id="14" name="Graphic 13" descr="Laptop with solid fill">
-            <a:extLst>
-              <a:ext uri="{FF2B5EF4-FFF2-40B4-BE49-F238E27FC236}">
-                <a16:creationId xmlns:a16="http://schemas.microsoft.com/office/drawing/2014/main" id="{79F503FB-4A52-1A9F-6CC9-C79CBBD9BF32}"/>
-              </a:ext>
-            </a:extLst>
-          </p:cNvPr>
-          <p:cNvPicPr>
-            <a:picLocks noChangeAspect="1"/>
-          </p:cNvPicPr>
-          <p:nvPr/>
-        </p:nvPicPr>
-        <p:blipFill>
-          <a:blip r:embed="rId7">
-            <a:extLst>
-              <a:ext uri="{96DAC541-7B7A-43D3-8B79-37D633B846F1}">
-                <asvg:svgBlip xmlns:asvg="http://schemas.microsoft.com/office/drawing/2016/SVG/main" r:embed="rId8"/>
-              </a:ext>
-            </a:extLst>
-          </a:blip>
-          <a:stretch>
-            <a:fillRect/>
-          </a:stretch>
-        </p:blipFill>
-        <p:spPr>
-          <a:xfrm>
-            <a:off x="126458" y="23356"/>
-            <a:ext cx="914400" cy="914400"/>
-          </a:xfrm>
-          <a:prstGeom prst="rect">
-            <a:avLst/>
-          </a:prstGeom>
-        </p:spPr>
-      </p:pic>
       <p:grpSp>
         <p:nvGrpSpPr>
           <p:cNvPr id="54" name="Group 53">
             <a:extLst>
               <a:ext uri="{FF2B5EF4-FFF2-40B4-BE49-F238E27FC236}">
-                <a16:creationId xmlns:a16="http://schemas.microsoft.com/office/drawing/2014/main" id="{FAE5CC1B-718C-E9CB-AF16-24BC169332AD}"/>
+                <a16:creationId xmlns:a16="http://schemas.microsoft.com/office/drawing/2014/main" id="{F9275C5F-004C-B753-8FD6-12D41D41119A}"/>
               </a:ext>
             </a:extLst>
           </p:cNvPr>
@@ -4099,7 +3961,7 @@
         </p:nvGrpSpPr>
         <p:grpSpPr>
           <a:xfrm>
-            <a:off x="336292" y="3429000"/>
+            <a:off x="2421647" y="775179"/>
             <a:ext cx="1100666" cy="206962"/>
             <a:chOff x="8513704" y="2991556"/>
             <a:chExt cx="1100666" cy="206962"/>
@@ -4110,7 +3972,7 @@
             <p:cNvPr id="22" name="Rectangle: Rounded Corners 21">
               <a:extLst>
                 <a:ext uri="{FF2B5EF4-FFF2-40B4-BE49-F238E27FC236}">
-                  <a16:creationId xmlns:a16="http://schemas.microsoft.com/office/drawing/2014/main" id="{AB0926FE-90BA-8393-3470-172E62CE252E}"/>
+                  <a16:creationId xmlns:a16="http://schemas.microsoft.com/office/drawing/2014/main" id="{E475A6FD-0CAB-393A-336F-2B01F65F34AC}"/>
                 </a:ext>
               </a:extLst>
             </p:cNvPr>
@@ -4150,7 +4012,7 @@
             <a:lstStyle/>
             <a:p>
               <a:pPr algn="ctr"/>
-              <a:endParaRPr lang="en-US"/>
+              <a:endParaRPr lang="en-US" noProof="0" dirty="0"/>
             </a:p>
           </p:txBody>
         </p:sp>
@@ -4159,7 +4021,7 @@
             <p:cNvPr id="23" name="Oval 22">
               <a:extLst>
                 <a:ext uri="{FF2B5EF4-FFF2-40B4-BE49-F238E27FC236}">
-                  <a16:creationId xmlns:a16="http://schemas.microsoft.com/office/drawing/2014/main" id="{5BA1D624-08CF-56B9-278E-F1C35BDAD701}"/>
+                  <a16:creationId xmlns:a16="http://schemas.microsoft.com/office/drawing/2014/main" id="{01946855-8BE3-754C-A46C-5665D3D72979}"/>
                 </a:ext>
               </a:extLst>
             </p:cNvPr>
@@ -4199,7 +4061,7 @@
             <a:lstStyle/>
             <a:p>
               <a:pPr algn="ctr"/>
-              <a:endParaRPr lang="en-US"/>
+              <a:endParaRPr lang="en-US" noProof="0" dirty="0"/>
             </a:p>
           </p:txBody>
         </p:sp>
@@ -4208,7 +4070,7 @@
             <p:cNvPr id="24" name="Oval 23">
               <a:extLst>
                 <a:ext uri="{FF2B5EF4-FFF2-40B4-BE49-F238E27FC236}">
-                  <a16:creationId xmlns:a16="http://schemas.microsoft.com/office/drawing/2014/main" id="{A5F74D18-F226-5415-2C02-3F075573DB39}"/>
+                  <a16:creationId xmlns:a16="http://schemas.microsoft.com/office/drawing/2014/main" id="{220DE000-F03F-B014-E8EF-04E29757669E}"/>
                 </a:ext>
               </a:extLst>
             </p:cNvPr>
@@ -4248,17 +4110,17 @@
             <a:lstStyle/>
             <a:p>
               <a:pPr algn="ctr"/>
-              <a:endParaRPr lang="en-US"/>
+              <a:endParaRPr lang="en-US" noProof="0" dirty="0"/>
             </a:p>
           </p:txBody>
         </p:sp>
       </p:grpSp>
       <p:sp>
         <p:nvSpPr>
-          <p:cNvPr id="86" name="TextBox 85">
+          <p:cNvPr id="93" name="TextBox 92">
             <a:extLst>
               <a:ext uri="{FF2B5EF4-FFF2-40B4-BE49-F238E27FC236}">
-                <a16:creationId xmlns:a16="http://schemas.microsoft.com/office/drawing/2014/main" id="{C2D1C9D3-15D1-E5B4-37C9-DC88D0B7A2ED}"/>
+                <a16:creationId xmlns:a16="http://schemas.microsoft.com/office/drawing/2014/main" id="{4912EF3A-4CD9-08B4-FD53-06F753A4BC85}"/>
               </a:ext>
             </a:extLst>
           </p:cNvPr>
@@ -4267,121 +4129,7 @@
         </p:nvSpPr>
         <p:spPr>
           <a:xfrm>
-            <a:off x="2167382" y="878554"/>
-            <a:ext cx="1400270" cy="276999"/>
-          </a:xfrm>
-          <a:prstGeom prst="rect">
-            <a:avLst/>
-          </a:prstGeom>
-          <a:noFill/>
-        </p:spPr>
-        <p:txBody>
-          <a:bodyPr rot="0" spcFirstLastPara="0" vertOverflow="overflow" horzOverflow="overflow" vert="horz" wrap="square" lIns="91440" tIns="45720" rIns="91440" bIns="45720" numCol="1" spcCol="0" rtlCol="0" fromWordArt="0" anchor="t" anchorCtr="0" forceAA="0" compatLnSpc="1">
-            <a:prstTxWarp prst="textNoShape">
-              <a:avLst/>
-            </a:prstTxWarp>
-            <a:spAutoFit/>
-          </a:bodyPr>
-          <a:lstStyle/>
-          <a:p>
-            <a:r>
-              <a:rPr lang="en-US" sz="1200" dirty="0"/>
-              <a:t>Router</a:t>
-            </a:r>
-          </a:p>
-        </p:txBody>
-      </p:sp>
-      <p:sp>
-        <p:nvSpPr>
-          <p:cNvPr id="89" name="TextBox 88">
-            <a:extLst>
-              <a:ext uri="{FF2B5EF4-FFF2-40B4-BE49-F238E27FC236}">
-                <a16:creationId xmlns:a16="http://schemas.microsoft.com/office/drawing/2014/main" id="{7CC47AA3-C404-D285-27D1-8CF8B1ECE79E}"/>
-              </a:ext>
-            </a:extLst>
-          </p:cNvPr>
-          <p:cNvSpPr txBox="1"/>
-          <p:nvPr/>
-        </p:nvSpPr>
-        <p:spPr>
-          <a:xfrm>
-            <a:off x="0" y="873068"/>
-            <a:ext cx="1279555" cy="461665"/>
-          </a:xfrm>
-          <a:prstGeom prst="rect">
-            <a:avLst/>
-          </a:prstGeom>
-          <a:noFill/>
-        </p:spPr>
-        <p:txBody>
-          <a:bodyPr rot="0" spcFirstLastPara="0" vertOverflow="overflow" horzOverflow="overflow" vert="horz" wrap="square" lIns="91440" tIns="45720" rIns="91440" bIns="45720" numCol="1" spcCol="0" rtlCol="0" fromWordArt="0" anchor="t" anchorCtr="0" forceAA="0" compatLnSpc="1">
-            <a:prstTxWarp prst="textNoShape">
-              <a:avLst/>
-            </a:prstTxWarp>
-            <a:spAutoFit/>
-          </a:bodyPr>
-          <a:lstStyle/>
-          <a:p>
-            <a:r>
-              <a:rPr lang="en-US" sz="1200"/>
-              <a:t>Nvidia Jetson AGX Orin 32GB</a:t>
-            </a:r>
-          </a:p>
-        </p:txBody>
-      </p:sp>
-      <p:sp>
-        <p:nvSpPr>
-          <p:cNvPr id="91" name="TextBox 90">
-            <a:extLst>
-              <a:ext uri="{FF2B5EF4-FFF2-40B4-BE49-F238E27FC236}">
-                <a16:creationId xmlns:a16="http://schemas.microsoft.com/office/drawing/2014/main" id="{909688B7-C360-3570-7533-7A72C0EAFCCD}"/>
-              </a:ext>
-            </a:extLst>
-          </p:cNvPr>
-          <p:cNvSpPr txBox="1"/>
-          <p:nvPr/>
-        </p:nvSpPr>
-        <p:spPr>
-          <a:xfrm>
-            <a:off x="1231858" y="817310"/>
-            <a:ext cx="924962" cy="461665"/>
-          </a:xfrm>
-          <a:prstGeom prst="rect">
-            <a:avLst/>
-          </a:prstGeom>
-          <a:noFill/>
-        </p:spPr>
-        <p:txBody>
-          <a:bodyPr rot="0" spcFirstLastPara="0" vertOverflow="overflow" horzOverflow="overflow" vert="horz" wrap="square" lIns="91440" tIns="45720" rIns="91440" bIns="45720" numCol="1" spcCol="0" rtlCol="0" fromWordArt="0" anchor="t" anchorCtr="0" forceAA="0" compatLnSpc="1">
-            <a:prstTxWarp prst="textNoShape">
-              <a:avLst/>
-            </a:prstTxWarp>
-            <a:spAutoFit/>
-          </a:bodyPr>
-          <a:lstStyle/>
-          <a:p>
-            <a:r>
-              <a:rPr lang="en-US" sz="1200" dirty="0"/>
-              <a:t>Mini ITX Intel PC</a:t>
-            </a:r>
-          </a:p>
-        </p:txBody>
-      </p:sp>
-      <p:sp>
-        <p:nvSpPr>
-          <p:cNvPr id="93" name="TextBox 92">
-            <a:extLst>
-              <a:ext uri="{FF2B5EF4-FFF2-40B4-BE49-F238E27FC236}">
-                <a16:creationId xmlns:a16="http://schemas.microsoft.com/office/drawing/2014/main" id="{4F2A7021-AEA3-7AEA-4167-381E6FC76CD2}"/>
-              </a:ext>
-            </a:extLst>
-          </p:cNvPr>
-          <p:cNvSpPr txBox="1"/>
-          <p:nvPr/>
-        </p:nvSpPr>
-        <p:spPr>
-          <a:xfrm>
-            <a:off x="199000" y="3856734"/>
+            <a:off x="2127840" y="932411"/>
             <a:ext cx="1702051" cy="461665"/>
           </a:xfrm>
           <a:prstGeom prst="rect">
@@ -4398,332 +4146,87 @@
           </a:bodyPr>
           <a:lstStyle/>
           <a:p>
-            <a:r>
+            <a:pPr algn="ctr"/>
+            <a:br>
               <a:rPr lang="en-US" sz="1200" noProof="0" dirty="0"/>
-              <a:t>Stereolabs</a:t>
-            </a:r>
-            <a:r>
-              <a:rPr lang="en-US" sz="1200" dirty="0"/>
-              <a:t> ZED2i Depth Camera</a:t>
-            </a:r>
-          </a:p>
-        </p:txBody>
-      </p:sp>
-      <p:grpSp>
-        <p:nvGrpSpPr>
-          <p:cNvPr id="104" name="Group 103">
+            </a:br>
+            <a:r>
+              <a:rPr lang="en-US" sz="1200" noProof="0" dirty="0"/>
+              <a:t>Depth Camera</a:t>
+            </a:r>
+          </a:p>
+        </p:txBody>
+      </p:sp>
+      <p:sp>
+        <p:nvSpPr>
+          <p:cNvPr id="9" name="Rechteck: abgerundete Ecken 8">
             <a:extLst>
               <a:ext uri="{FF2B5EF4-FFF2-40B4-BE49-F238E27FC236}">
-                <a16:creationId xmlns:a16="http://schemas.microsoft.com/office/drawing/2014/main" id="{56DE8767-6B4C-A067-2937-C26BDC6F08A9}"/>
+                <a16:creationId xmlns:a16="http://schemas.microsoft.com/office/drawing/2014/main" id="{D821B99F-A7CC-79E9-BD32-CCB2794EBC35}"/>
               </a:ext>
             </a:extLst>
           </p:cNvPr>
-          <p:cNvGrpSpPr/>
+          <p:cNvSpPr/>
           <p:nvPr/>
-        </p:nvGrpSpPr>
-        <p:grpSpPr>
+        </p:nvSpPr>
+        <p:spPr>
           <a:xfrm>
-            <a:off x="2457405" y="5552446"/>
-            <a:ext cx="3639772" cy="1232185"/>
-            <a:chOff x="2146309" y="5399972"/>
-            <a:chExt cx="4072512" cy="1429740"/>
+            <a:off x="2309201" y="2471754"/>
+            <a:ext cx="1330625" cy="1039646"/>
           </a:xfrm>
-        </p:grpSpPr>
-        <p:sp>
-          <p:nvSpPr>
-            <p:cNvPr id="102" name="Rectangle 101">
-              <a:extLst>
-                <a:ext uri="{FF2B5EF4-FFF2-40B4-BE49-F238E27FC236}">
-                  <a16:creationId xmlns:a16="http://schemas.microsoft.com/office/drawing/2014/main" id="{8779E75E-CE2B-64CD-FEA6-E6586EBDD975}"/>
-                </a:ext>
-              </a:extLst>
-            </p:cNvPr>
-            <p:cNvSpPr/>
-            <p:nvPr/>
-          </p:nvSpPr>
-          <p:spPr>
-            <a:xfrm>
-              <a:off x="2146309" y="5671577"/>
-              <a:ext cx="4072457" cy="1158135"/>
-            </a:xfrm>
-            <a:prstGeom prst="rect">
-              <a:avLst/>
-            </a:prstGeom>
-          </p:spPr>
-          <p:style>
-            <a:lnRef idx="2">
-              <a:schemeClr val="dk1"/>
-            </a:lnRef>
-            <a:fillRef idx="1">
-              <a:schemeClr val="lt1"/>
-            </a:fillRef>
-            <a:effectRef idx="0">
-              <a:schemeClr val="dk1"/>
-            </a:effectRef>
-            <a:fontRef idx="minor">
-              <a:schemeClr val="dk1"/>
-            </a:fontRef>
-          </p:style>
-          <p:txBody>
-            <a:bodyPr rtlCol="0" anchor="ctr"/>
-            <a:lstStyle/>
-            <a:p>
-              <a:pPr algn="ctr"/>
-              <a:endParaRPr lang="en-US"/>
-            </a:p>
-          </p:txBody>
-        </p:sp>
-        <p:cxnSp>
-          <p:nvCxnSpPr>
-            <p:cNvPr id="96" name="Straight Arrow Connector 95">
-              <a:extLst>
-                <a:ext uri="{FF2B5EF4-FFF2-40B4-BE49-F238E27FC236}">
-                  <a16:creationId xmlns:a16="http://schemas.microsoft.com/office/drawing/2014/main" id="{7ECD9DED-8324-55AC-554D-1298D880B0C4}"/>
-                </a:ext>
-              </a:extLst>
-            </p:cNvPr>
-            <p:cNvCxnSpPr>
-              <a:cxnSpLocks/>
-            </p:cNvCxnSpPr>
-            <p:nvPr/>
-          </p:nvCxnSpPr>
-          <p:spPr>
-            <a:xfrm flipV="1">
-              <a:off x="2423140" y="5825708"/>
-              <a:ext cx="1017880" cy="1844"/>
-            </a:xfrm>
-            <a:prstGeom prst="straightConnector1">
-              <a:avLst/>
-            </a:prstGeom>
-            <a:ln>
-              <a:prstDash val="dash"/>
-              <a:tailEnd type="triangle"/>
-            </a:ln>
-          </p:spPr>
-          <p:style>
-            <a:lnRef idx="1">
-              <a:schemeClr val="accent1"/>
-            </a:lnRef>
-            <a:fillRef idx="0">
-              <a:schemeClr val="accent1"/>
-            </a:fillRef>
-            <a:effectRef idx="0">
-              <a:schemeClr val="accent1"/>
-            </a:effectRef>
-            <a:fontRef idx="minor">
-              <a:schemeClr val="tx1"/>
-            </a:fontRef>
-          </p:style>
-        </p:cxnSp>
-        <p:sp>
-          <p:nvSpPr>
-            <p:cNvPr id="97" name="TextBox 96">
-              <a:extLst>
-                <a:ext uri="{FF2B5EF4-FFF2-40B4-BE49-F238E27FC236}">
-                  <a16:creationId xmlns:a16="http://schemas.microsoft.com/office/drawing/2014/main" id="{2B2640E2-C560-3097-8961-39CA5284DF27}"/>
-                </a:ext>
-              </a:extLst>
-            </p:cNvPr>
-            <p:cNvSpPr txBox="1"/>
-            <p:nvPr/>
-          </p:nvSpPr>
-          <p:spPr>
-            <a:xfrm>
-              <a:off x="3475621" y="5671668"/>
-              <a:ext cx="2743200" cy="276999"/>
-            </a:xfrm>
-            <a:prstGeom prst="rect">
-              <a:avLst/>
-            </a:prstGeom>
-            <a:noFill/>
-          </p:spPr>
-          <p:txBody>
-            <a:bodyPr rot="0" spcFirstLastPara="0" vertOverflow="overflow" horzOverflow="overflow" vert="horz" wrap="square" lIns="91440" tIns="45720" rIns="91440" bIns="45720" numCol="1" spcCol="0" rtlCol="0" fromWordArt="0" anchor="t" anchorCtr="0" forceAA="0" compatLnSpc="1">
-              <a:prstTxWarp prst="textNoShape">
-                <a:avLst/>
-              </a:prstTxWarp>
-              <a:spAutoFit/>
-            </a:bodyPr>
-            <a:lstStyle/>
-            <a:p>
-              <a:r>
-                <a:rPr lang="en-US" sz="1200" dirty="0"/>
-                <a:t>USB</a:t>
-              </a:r>
-            </a:p>
-          </p:txBody>
-        </p:sp>
-        <p:cxnSp>
-          <p:nvCxnSpPr>
-            <p:cNvPr id="98" name="Straight Arrow Connector 97">
-              <a:extLst>
-                <a:ext uri="{FF2B5EF4-FFF2-40B4-BE49-F238E27FC236}">
-                  <a16:creationId xmlns:a16="http://schemas.microsoft.com/office/drawing/2014/main" id="{E683F014-C597-0053-DA33-FCC2CC2B63EC}"/>
-                </a:ext>
-              </a:extLst>
-            </p:cNvPr>
-            <p:cNvCxnSpPr>
-              <a:cxnSpLocks/>
-            </p:cNvCxnSpPr>
-            <p:nvPr/>
-          </p:nvCxnSpPr>
-          <p:spPr>
-            <a:xfrm>
-              <a:off x="2424384" y="6144663"/>
-              <a:ext cx="1016847" cy="7696"/>
-            </a:xfrm>
-            <a:prstGeom prst="straightConnector1">
-              <a:avLst/>
-            </a:prstGeom>
-            <a:ln>
-              <a:tailEnd type="triangle"/>
-            </a:ln>
-          </p:spPr>
-          <p:style>
-            <a:lnRef idx="2">
-              <a:schemeClr val="accent1"/>
-            </a:lnRef>
-            <a:fillRef idx="0">
-              <a:schemeClr val="accent1"/>
-            </a:fillRef>
-            <a:effectRef idx="1">
-              <a:schemeClr val="accent1"/>
-            </a:effectRef>
-            <a:fontRef idx="minor">
-              <a:schemeClr val="tx1"/>
-            </a:fontRef>
-          </p:style>
-        </p:cxnSp>
-        <p:sp>
-          <p:nvSpPr>
-            <p:cNvPr id="99" name="TextBox 98">
-              <a:extLst>
-                <a:ext uri="{FF2B5EF4-FFF2-40B4-BE49-F238E27FC236}">
-                  <a16:creationId xmlns:a16="http://schemas.microsoft.com/office/drawing/2014/main" id="{EB14C677-4EEC-3E45-C879-C171B7FAF17A}"/>
-                </a:ext>
-              </a:extLst>
-            </p:cNvPr>
-            <p:cNvSpPr txBox="1"/>
-            <p:nvPr/>
-          </p:nvSpPr>
-          <p:spPr>
-            <a:xfrm>
-              <a:off x="3475620" y="5996084"/>
-              <a:ext cx="2743200" cy="276999"/>
-            </a:xfrm>
-            <a:prstGeom prst="rect">
-              <a:avLst/>
-            </a:prstGeom>
-            <a:noFill/>
-          </p:spPr>
-          <p:txBody>
-            <a:bodyPr rot="0" spcFirstLastPara="0" vertOverflow="overflow" horzOverflow="overflow" vert="horz" wrap="square" lIns="91440" tIns="45720" rIns="91440" bIns="45720" numCol="1" spcCol="0" rtlCol="0" fromWordArt="0" anchor="t" anchorCtr="0" forceAA="0" compatLnSpc="1">
-              <a:prstTxWarp prst="textNoShape">
-                <a:avLst/>
-              </a:prstTxWarp>
-              <a:spAutoFit/>
-            </a:bodyPr>
-            <a:lstStyle/>
-            <a:p>
-              <a:r>
-                <a:rPr lang="en-US" sz="1200" dirty="0"/>
-                <a:t>Ethernet</a:t>
-              </a:r>
-            </a:p>
-          </p:txBody>
-        </p:sp>
-        <p:sp>
-          <p:nvSpPr>
-            <p:cNvPr id="101" name="TextBox 100">
-              <a:extLst>
-                <a:ext uri="{FF2B5EF4-FFF2-40B4-BE49-F238E27FC236}">
-                  <a16:creationId xmlns:a16="http://schemas.microsoft.com/office/drawing/2014/main" id="{AD88901A-6F3E-9D42-700E-AC7F0D8FECB6}"/>
-                </a:ext>
-              </a:extLst>
-            </p:cNvPr>
-            <p:cNvSpPr txBox="1"/>
-            <p:nvPr/>
-          </p:nvSpPr>
-          <p:spPr>
-            <a:xfrm>
-              <a:off x="3468074" y="6305410"/>
-              <a:ext cx="2743200" cy="321410"/>
-            </a:xfrm>
-            <a:prstGeom prst="rect">
-              <a:avLst/>
-            </a:prstGeom>
-            <a:noFill/>
-          </p:spPr>
-          <p:txBody>
-            <a:bodyPr rot="0" spcFirstLastPara="0" vertOverflow="overflow" horzOverflow="overflow" vert="horz" wrap="square" lIns="91440" tIns="45720" rIns="91440" bIns="45720" numCol="1" spcCol="0" rtlCol="0" fromWordArt="0" anchor="t" anchorCtr="0" forceAA="0" compatLnSpc="1">
-              <a:prstTxWarp prst="textNoShape">
-                <a:avLst/>
-              </a:prstTxWarp>
-              <a:spAutoFit/>
-            </a:bodyPr>
-            <a:lstStyle/>
-            <a:p>
-              <a:r>
-                <a:rPr lang="en-US" sz="1200" dirty="0"/>
-                <a:t>Control </a:t>
-              </a:r>
-            </a:p>
-          </p:txBody>
-        </p:sp>
-        <p:sp>
-          <p:nvSpPr>
-            <p:cNvPr id="103" name="Rectangle 102">
-              <a:extLst>
-                <a:ext uri="{FF2B5EF4-FFF2-40B4-BE49-F238E27FC236}">
-                  <a16:creationId xmlns:a16="http://schemas.microsoft.com/office/drawing/2014/main" id="{BB884518-C736-E829-4178-CF9FF26239F7}"/>
-                </a:ext>
-              </a:extLst>
-            </p:cNvPr>
-            <p:cNvSpPr/>
-            <p:nvPr/>
-          </p:nvSpPr>
-          <p:spPr>
-            <a:xfrm>
-              <a:off x="2146309" y="5399972"/>
-              <a:ext cx="4072457" cy="275422"/>
-            </a:xfrm>
-            <a:prstGeom prst="rect">
-              <a:avLst/>
-            </a:prstGeom>
-          </p:spPr>
-          <p:style>
-            <a:lnRef idx="2">
-              <a:schemeClr val="dk1"/>
-            </a:lnRef>
-            <a:fillRef idx="1">
-              <a:schemeClr val="lt1"/>
-            </a:fillRef>
-            <a:effectRef idx="0">
-              <a:schemeClr val="dk1"/>
-            </a:effectRef>
-            <a:fontRef idx="minor">
-              <a:schemeClr val="dk1"/>
-            </a:fontRef>
-          </p:style>
-          <p:txBody>
-            <a:bodyPr lIns="91440" tIns="45720" rIns="91440" bIns="45720" rtlCol="0" anchor="ctr"/>
-            <a:lstStyle/>
-            <a:p>
-              <a:pPr algn="ctr"/>
-              <a:r>
-                <a:rPr lang="en-US" sz="1200" dirty="0"/>
-                <a:t>Legends</a:t>
-              </a:r>
-            </a:p>
-          </p:txBody>
-        </p:sp>
-      </p:grpSp>
+          <a:prstGeom prst="roundRect">
+            <a:avLst/>
+          </a:prstGeom>
+        </p:spPr>
+        <p:style>
+          <a:lnRef idx="2">
+            <a:schemeClr val="accent1">
+              <a:shade val="15000"/>
+            </a:schemeClr>
+          </a:lnRef>
+          <a:fillRef idx="1">
+            <a:schemeClr val="accent1"/>
+          </a:fillRef>
+          <a:effectRef idx="0">
+            <a:schemeClr val="accent1"/>
+          </a:effectRef>
+          <a:fontRef idx="minor">
+            <a:schemeClr val="lt1"/>
+          </a:fontRef>
+        </p:style>
+        <p:txBody>
+          <a:bodyPr rtlCol="0" anchor="ctr"/>
+          <a:lstStyle/>
+          <a:p>
+            <a:pPr algn="ctr"/>
+            <a:endParaRPr lang="en-US" noProof="0" dirty="0"/>
+          </a:p>
+          <a:p>
+            <a:pPr algn="ctr"/>
+            <a:r>
+              <a:rPr lang="en-US" noProof="0" dirty="0"/>
+              <a:t>YOLO</a:t>
+            </a:r>
+          </a:p>
+          <a:p>
+            <a:pPr algn="ctr"/>
+            <a:r>
+              <a:rPr lang="en-US" sz="1200" noProof="0" dirty="0"/>
+              <a:t>What and where is the object in the image plane?</a:t>
+            </a:r>
+          </a:p>
+          <a:p>
+            <a:pPr algn="ctr"/>
+            <a:endParaRPr lang="en-US" noProof="0" dirty="0"/>
+          </a:p>
+        </p:txBody>
+      </p:sp>
       <p:pic>
         <p:nvPicPr>
-          <p:cNvPr id="6" name="Graphic 5" descr="Radio microphone with solid fill">
+          <p:cNvPr id="3" name="Grafik 2" descr="Künstliche Intelligenz mit einfarbiger Füllung">
             <a:extLst>
               <a:ext uri="{FF2B5EF4-FFF2-40B4-BE49-F238E27FC236}">
-                <a16:creationId xmlns:a16="http://schemas.microsoft.com/office/drawing/2014/main" id="{09FB18A4-6616-59DC-4E4C-5FA4FC7572D2}"/>
+                <a16:creationId xmlns:a16="http://schemas.microsoft.com/office/drawing/2014/main" id="{6BAD662A-CA97-3959-527A-4E33693E9DC8}"/>
               </a:ext>
             </a:extLst>
           </p:cNvPr>
@@ -4733,10 +4236,10 @@
           <p:nvPr/>
         </p:nvPicPr>
         <p:blipFill>
-          <a:blip r:embed="rId9">
+          <a:blip r:embed="rId2">
             <a:extLst>
               <a:ext uri="{96DAC541-7B7A-43D3-8B79-37D633B846F1}">
-                <asvg:svgBlip xmlns:asvg="http://schemas.microsoft.com/office/drawing/2016/SVG/main" r:embed="rId10"/>
+                <asvg:svgBlip xmlns:asvg="http://schemas.microsoft.com/office/drawing/2016/SVG/main" r:embed="rId3"/>
               </a:ext>
             </a:extLst>
           </a:blip>
@@ -4746,8 +4249,8 @@
         </p:blipFill>
         <p:spPr>
           <a:xfrm>
-            <a:off x="1613174" y="3263426"/>
-            <a:ext cx="622771" cy="632179"/>
+            <a:off x="8190318" y="943382"/>
+            <a:ext cx="914400" cy="914400"/>
           </a:xfrm>
           <a:prstGeom prst="rect">
             <a:avLst/>
@@ -4756,10 +4259,10 @@
       </p:pic>
       <p:pic>
         <p:nvPicPr>
-          <p:cNvPr id="8" name="Graphic 7" descr="Volume with solid fill">
+          <p:cNvPr id="7" name="Grafik 6" descr="Gehirn im Kopf mit einfarbiger Füllung">
             <a:extLst>
               <a:ext uri="{FF2B5EF4-FFF2-40B4-BE49-F238E27FC236}">
-                <a16:creationId xmlns:a16="http://schemas.microsoft.com/office/drawing/2014/main" id="{A7FC7613-B39A-D4E2-D008-D9B2BA9F1180}"/>
+                <a16:creationId xmlns:a16="http://schemas.microsoft.com/office/drawing/2014/main" id="{19006F51-81DF-66F9-C7E5-69BBD90C511B}"/>
               </a:ext>
             </a:extLst>
           </p:cNvPr>
@@ -4769,10 +4272,10 @@
           <p:nvPr/>
         </p:nvPicPr>
         <p:blipFill>
-          <a:blip r:embed="rId11">
+          <a:blip r:embed="rId4">
             <a:extLst>
               <a:ext uri="{96DAC541-7B7A-43D3-8B79-37D633B846F1}">
-                <asvg:svgBlip xmlns:asvg="http://schemas.microsoft.com/office/drawing/2016/SVG/main" r:embed="rId12"/>
+                <asvg:svgBlip xmlns:asvg="http://schemas.microsoft.com/office/drawing/2016/SVG/main" r:embed="rId5"/>
               </a:ext>
             </a:extLst>
           </a:blip>
@@ -4782,8 +4285,1400 @@
         </p:blipFill>
         <p:spPr>
           <a:xfrm>
-            <a:off x="2457405" y="3169352"/>
-            <a:ext cx="763882" cy="726253"/>
+            <a:off x="115439" y="618099"/>
+            <a:ext cx="914400" cy="914400"/>
+          </a:xfrm>
+          <a:prstGeom prst="rect">
+            <a:avLst/>
+          </a:prstGeom>
+        </p:spPr>
+      </p:pic>
+      <p:sp>
+        <p:nvSpPr>
+          <p:cNvPr id="26" name="TextBox 92">
+            <a:extLst>
+              <a:ext uri="{FF2B5EF4-FFF2-40B4-BE49-F238E27FC236}">
+                <a16:creationId xmlns:a16="http://schemas.microsoft.com/office/drawing/2014/main" id="{3E922A06-8A4B-8806-58D8-C4E22DD76004}"/>
+              </a:ext>
+            </a:extLst>
+          </p:cNvPr>
+          <p:cNvSpPr txBox="1"/>
+          <p:nvPr/>
+        </p:nvSpPr>
+        <p:spPr>
+          <a:xfrm>
+            <a:off x="7402638" y="547231"/>
+            <a:ext cx="2489760" cy="461665"/>
+          </a:xfrm>
+          <a:prstGeom prst="rect">
+            <a:avLst/>
+          </a:prstGeom>
+          <a:noFill/>
+        </p:spPr>
+        <p:txBody>
+          <a:bodyPr rot="0" spcFirstLastPara="0" vertOverflow="overflow" horzOverflow="overflow" vert="horz" wrap="square" lIns="91440" tIns="45720" rIns="91440" bIns="45720" numCol="1" spcCol="0" rtlCol="0" fromWordArt="0" anchor="t" anchorCtr="0" forceAA="0" compatLnSpc="1">
+            <a:prstTxWarp prst="textNoShape">
+              <a:avLst/>
+            </a:prstTxWarp>
+            <a:spAutoFit/>
+          </a:bodyPr>
+          <a:lstStyle/>
+          <a:p>
+            <a:pPr algn="ctr"/>
+            <a:r>
+              <a:rPr lang="en-US" sz="1200" noProof="0" dirty="0"/>
+              <a:t>LLM/VLM answer </a:t>
+            </a:r>
+            <a:br>
+              <a:rPr lang="en-US" sz="1200" noProof="0" dirty="0"/>
+            </a:br>
+            <a:endParaRPr lang="en-US" sz="1200" noProof="0" dirty="0"/>
+          </a:p>
+        </p:txBody>
+      </p:sp>
+      <p:sp>
+        <p:nvSpPr>
+          <p:cNvPr id="28" name="TextBox 92">
+            <a:extLst>
+              <a:ext uri="{FF2B5EF4-FFF2-40B4-BE49-F238E27FC236}">
+                <a16:creationId xmlns:a16="http://schemas.microsoft.com/office/drawing/2014/main" id="{BADC9603-D9CC-C92C-3514-A87AC6A0477B}"/>
+              </a:ext>
+            </a:extLst>
+          </p:cNvPr>
+          <p:cNvSpPr txBox="1"/>
+          <p:nvPr/>
+        </p:nvSpPr>
+        <p:spPr>
+          <a:xfrm>
+            <a:off x="1247200" y="1422764"/>
+            <a:ext cx="738571" cy="461665"/>
+          </a:xfrm>
+          <a:prstGeom prst="rect">
+            <a:avLst/>
+          </a:prstGeom>
+          <a:noFill/>
+        </p:spPr>
+        <p:txBody>
+          <a:bodyPr rot="0" spcFirstLastPara="0" vertOverflow="overflow" horzOverflow="overflow" vert="horz" wrap="square" lIns="91440" tIns="45720" rIns="91440" bIns="45720" numCol="1" spcCol="0" rtlCol="0" fromWordArt="0" anchor="t" anchorCtr="0" forceAA="0" compatLnSpc="1">
+            <a:prstTxWarp prst="textNoShape">
+              <a:avLst/>
+            </a:prstTxWarp>
+            <a:spAutoFit/>
+          </a:bodyPr>
+          <a:lstStyle/>
+          <a:p>
+            <a:r>
+              <a:rPr lang="en-US" sz="1200" noProof="0" dirty="0"/>
+              <a:t>GUI</a:t>
+            </a:r>
+          </a:p>
+          <a:p>
+            <a:r>
+              <a:rPr lang="en-US" sz="1200" dirty="0"/>
+              <a:t>STT</a:t>
+            </a:r>
+            <a:endParaRPr lang="en-US" sz="1200" noProof="0" dirty="0"/>
+          </a:p>
+        </p:txBody>
+      </p:sp>
+      <p:sp>
+        <p:nvSpPr>
+          <p:cNvPr id="29" name="TextBox 92">
+            <a:extLst>
+              <a:ext uri="{FF2B5EF4-FFF2-40B4-BE49-F238E27FC236}">
+                <a16:creationId xmlns:a16="http://schemas.microsoft.com/office/drawing/2014/main" id="{4493AC30-8DDF-953D-4215-B740BB3F620C}"/>
+              </a:ext>
+            </a:extLst>
+          </p:cNvPr>
+          <p:cNvSpPr txBox="1"/>
+          <p:nvPr/>
+        </p:nvSpPr>
+        <p:spPr>
+          <a:xfrm>
+            <a:off x="-49205" y="1662044"/>
+            <a:ext cx="1350955" cy="2492990"/>
+          </a:xfrm>
+          <a:prstGeom prst="rect">
+            <a:avLst/>
+          </a:prstGeom>
+          <a:noFill/>
+        </p:spPr>
+        <p:txBody>
+          <a:bodyPr rot="0" spcFirstLastPara="0" vertOverflow="overflow" horzOverflow="overflow" vert="horz" wrap="square" lIns="91440" tIns="45720" rIns="91440" bIns="45720" numCol="1" spcCol="0" rtlCol="0" fromWordArt="0" anchor="t" anchorCtr="0" forceAA="0" compatLnSpc="1">
+            <a:prstTxWarp prst="textNoShape">
+              <a:avLst/>
+            </a:prstTxWarp>
+            <a:spAutoFit/>
+          </a:bodyPr>
+          <a:lstStyle/>
+          <a:p>
+            <a:r>
+              <a:rPr lang="en-US" sz="1200" noProof="0" dirty="0"/>
+              <a:t>Possible user input: </a:t>
+            </a:r>
+          </a:p>
+          <a:p>
+            <a:pPr marL="228600" indent="-228600">
+              <a:buFont typeface="+mj-lt"/>
+              <a:buAutoNum type="alphaLcPeriod"/>
+            </a:pPr>
+            <a:r>
+              <a:rPr lang="en-US" sz="1200" noProof="0" dirty="0">
+                <a:solidFill>
+                  <a:schemeClr val="accent1"/>
+                </a:solidFill>
+              </a:rPr>
+              <a:t>“Analyze the    scene!”</a:t>
+            </a:r>
+          </a:p>
+          <a:p>
+            <a:pPr marL="228600" indent="-228600">
+              <a:buFont typeface="+mj-lt"/>
+              <a:buAutoNum type="alphaLcPeriod"/>
+            </a:pPr>
+            <a:r>
+              <a:rPr lang="en-US" sz="1200" noProof="0" dirty="0">
+                <a:solidFill>
+                  <a:schemeClr val="accent2"/>
+                </a:solidFill>
+              </a:rPr>
+              <a:t>“Drive to</a:t>
+            </a:r>
+            <a:r>
+              <a:rPr lang="en-US" sz="1200" dirty="0">
+                <a:solidFill>
+                  <a:schemeClr val="accent2"/>
+                </a:solidFill>
+              </a:rPr>
+              <a:t> </a:t>
+            </a:r>
+            <a:r>
+              <a:rPr lang="en-US" sz="1200" noProof="0" dirty="0">
+                <a:solidFill>
+                  <a:schemeClr val="accent2"/>
+                </a:solidFill>
+              </a:rPr>
+              <a:t>object ABC!”</a:t>
+            </a:r>
+          </a:p>
+          <a:p>
+            <a:pPr marL="228600" indent="-228600">
+              <a:buFont typeface="+mj-lt"/>
+              <a:buAutoNum type="alphaLcPeriod"/>
+            </a:pPr>
+            <a:r>
+              <a:rPr lang="en-US" sz="1200" noProof="0" dirty="0">
+                <a:solidFill>
+                  <a:schemeClr val="accent6"/>
+                </a:solidFill>
+              </a:rPr>
+              <a:t>“What is your current motor temperature”</a:t>
+            </a:r>
+          </a:p>
+          <a:p>
+            <a:pPr marL="228600" indent="-228600">
+              <a:buFont typeface="+mj-lt"/>
+              <a:buAutoNum type="alphaLcPeriod"/>
+            </a:pPr>
+            <a:r>
+              <a:rPr lang="en-US" sz="1200" noProof="0" dirty="0">
+                <a:solidFill>
+                  <a:schemeClr val="accent5"/>
+                </a:solidFill>
+              </a:rPr>
+              <a:t>“Can you explain how to use your system?”</a:t>
+            </a:r>
+          </a:p>
+        </p:txBody>
+      </p:sp>
+      <mc:AlternateContent xmlns:mc="http://schemas.openxmlformats.org/markup-compatibility/2006" xmlns:a14="http://schemas.microsoft.com/office/drawing/2010/main">
+        <mc:Choice Requires="a14">
+          <p:sp>
+            <p:nvSpPr>
+              <p:cNvPr id="30" name="TextBox 92">
+                <a:extLst>
+                  <a:ext uri="{FF2B5EF4-FFF2-40B4-BE49-F238E27FC236}">
+                    <a16:creationId xmlns:a16="http://schemas.microsoft.com/office/drawing/2014/main" id="{85C73D6A-7E95-6B7F-617D-4989B264950E}"/>
+                  </a:ext>
+                </a:extLst>
+              </p:cNvPr>
+              <p:cNvSpPr txBox="1"/>
+              <p:nvPr/>
+            </p:nvSpPr>
+            <p:spPr>
+              <a:xfrm>
+                <a:off x="2107538" y="316398"/>
+                <a:ext cx="1676111" cy="461665"/>
+              </a:xfrm>
+              <a:prstGeom prst="rect">
+                <a:avLst/>
+              </a:prstGeom>
+              <a:noFill/>
+            </p:spPr>
+            <p:txBody>
+              <a:bodyPr rot="0" spcFirstLastPara="0" vertOverflow="overflow" horzOverflow="overflow" vert="horz" wrap="square" lIns="91440" tIns="45720" rIns="91440" bIns="45720" numCol="1" spcCol="0" rtlCol="0" fromWordArt="0" anchor="t" anchorCtr="0" forceAA="0" compatLnSpc="1">
+                <a:prstTxWarp prst="textNoShape">
+                  <a:avLst/>
+                </a:prstTxWarp>
+                <a:spAutoFit/>
+              </a:bodyPr>
+              <a:lstStyle/>
+              <a:p>
+                <a:pPr algn="ctr"/>
+                <a:r>
+                  <a:rPr lang="en-US" sz="1200" noProof="0" dirty="0"/>
+                  <a:t>How far is the object </a:t>
+                </a:r>
+                <a:br>
+                  <a:rPr lang="en-US" sz="1200" noProof="0" dirty="0"/>
+                </a:br>
+                <a:r>
+                  <a:rPr lang="en-US" sz="1200" noProof="0" dirty="0"/>
+                  <a:t>(</a:t>
+                </a:r>
+                <a14:m>
+                  <m:oMath xmlns:m="http://schemas.openxmlformats.org/officeDocument/2006/math">
+                    <m:r>
+                      <a:rPr lang="en-US" sz="1200" b="0" i="1" noProof="0" smtClean="0">
+                        <a:latin typeface="Cambria Math" panose="02040503050406030204" pitchFamily="18" charset="0"/>
+                      </a:rPr>
+                      <m:t>𝑧</m:t>
+                    </m:r>
+                  </m:oMath>
+                </a14:m>
+                <a:r>
+                  <a:rPr lang="en-US" sz="1200" noProof="0" dirty="0"/>
+                  <a:t>-distance)?</a:t>
+                </a:r>
+              </a:p>
+            </p:txBody>
+          </p:sp>
+        </mc:Choice>
+        <mc:Fallback xmlns="">
+          <p:sp>
+            <p:nvSpPr>
+              <p:cNvPr id="30" name="TextBox 92">
+                <a:extLst>
+                  <a:ext uri="{FF2B5EF4-FFF2-40B4-BE49-F238E27FC236}">
+                    <a16:creationId xmlns:a16="http://schemas.microsoft.com/office/drawing/2014/main" id="{85C73D6A-7E95-6B7F-617D-4989B264950E}"/>
+                  </a:ext>
+                </a:extLst>
+              </p:cNvPr>
+              <p:cNvSpPr txBox="1">
+                <a:spLocks noRot="1" noChangeAspect="1" noMove="1" noResize="1" noEditPoints="1" noAdjustHandles="1" noChangeArrowheads="1" noChangeShapeType="1" noTextEdit="1"/>
+              </p:cNvSpPr>
+              <p:nvPr/>
+            </p:nvSpPr>
+            <p:spPr>
+              <a:xfrm>
+                <a:off x="2107538" y="316398"/>
+                <a:ext cx="1676111" cy="461665"/>
+              </a:xfrm>
+              <a:prstGeom prst="rect">
+                <a:avLst/>
+              </a:prstGeom>
+              <a:blipFill>
+                <a:blip r:embed="rId6"/>
+                <a:stretch>
+                  <a:fillRect t="-1316" b="-9211"/>
+                </a:stretch>
+              </a:blipFill>
+            </p:spPr>
+            <p:txBody>
+              <a:bodyPr/>
+              <a:lstStyle/>
+              <a:p>
+                <a:r>
+                  <a:rPr lang="de-DE">
+                    <a:noFill/>
+                  </a:rPr>
+                  <a:t> </a:t>
+                </a:r>
+              </a:p>
+            </p:txBody>
+          </p:sp>
+        </mc:Fallback>
+      </mc:AlternateContent>
+      <p:sp>
+        <p:nvSpPr>
+          <p:cNvPr id="2" name="Rechteck: abgerundete Ecken 1">
+            <a:extLst>
+              <a:ext uri="{FF2B5EF4-FFF2-40B4-BE49-F238E27FC236}">
+                <a16:creationId xmlns:a16="http://schemas.microsoft.com/office/drawing/2014/main" id="{01C319C6-E969-B727-66A3-2218C15AF1B6}"/>
+              </a:ext>
+            </a:extLst>
+          </p:cNvPr>
+          <p:cNvSpPr/>
+          <p:nvPr/>
+        </p:nvSpPr>
+        <p:spPr>
+          <a:xfrm>
+            <a:off x="2029558" y="273889"/>
+            <a:ext cx="1857537" cy="3378518"/>
+          </a:xfrm>
+          <a:prstGeom prst="roundRect">
+            <a:avLst/>
+          </a:prstGeom>
+          <a:noFill/>
+          <a:ln>
+            <a:solidFill>
+              <a:schemeClr val="tx1"/>
+            </a:solidFill>
+          </a:ln>
+        </p:spPr>
+        <p:style>
+          <a:lnRef idx="2">
+            <a:schemeClr val="accent1">
+              <a:shade val="15000"/>
+            </a:schemeClr>
+          </a:lnRef>
+          <a:fillRef idx="1">
+            <a:schemeClr val="accent1"/>
+          </a:fillRef>
+          <a:effectRef idx="0">
+            <a:schemeClr val="accent1"/>
+          </a:effectRef>
+          <a:fontRef idx="minor">
+            <a:schemeClr val="lt1"/>
+          </a:fontRef>
+        </p:style>
+        <p:txBody>
+          <a:bodyPr rtlCol="0" anchor="ctr"/>
+          <a:lstStyle/>
+          <a:p>
+            <a:pPr algn="ctr"/>
+            <a:endParaRPr lang="en-US" noProof="0" dirty="0">
+              <a:solidFill>
+                <a:schemeClr val="tx1"/>
+              </a:solidFill>
+            </a:endParaRPr>
+          </a:p>
+        </p:txBody>
+      </p:sp>
+      <p:sp>
+        <p:nvSpPr>
+          <p:cNvPr id="5" name="TextBox 92">
+            <a:extLst>
+              <a:ext uri="{FF2B5EF4-FFF2-40B4-BE49-F238E27FC236}">
+                <a16:creationId xmlns:a16="http://schemas.microsoft.com/office/drawing/2014/main" id="{66059CD8-1532-9A33-3188-F80DFC37A970}"/>
+              </a:ext>
+            </a:extLst>
+          </p:cNvPr>
+          <p:cNvSpPr txBox="1"/>
+          <p:nvPr/>
+        </p:nvSpPr>
+        <p:spPr>
+          <a:xfrm>
+            <a:off x="-359734" y="0"/>
+            <a:ext cx="1676111" cy="276999"/>
+          </a:xfrm>
+          <a:prstGeom prst="rect">
+            <a:avLst/>
+          </a:prstGeom>
+          <a:noFill/>
+        </p:spPr>
+        <p:txBody>
+          <a:bodyPr rot="0" spcFirstLastPara="0" vertOverflow="overflow" horzOverflow="overflow" vert="horz" wrap="square" lIns="91440" tIns="45720" rIns="91440" bIns="45720" numCol="1" spcCol="0" rtlCol="0" fromWordArt="0" anchor="t" anchorCtr="0" forceAA="0" compatLnSpc="1">
+            <a:prstTxWarp prst="textNoShape">
+              <a:avLst/>
+            </a:prstTxWarp>
+            <a:spAutoFit/>
+          </a:bodyPr>
+          <a:lstStyle/>
+          <a:p>
+            <a:pPr algn="ctr"/>
+            <a:r>
+              <a:rPr lang="en-US" sz="1200" u="sng" noProof="0" dirty="0"/>
+              <a:t>Human</a:t>
+            </a:r>
+          </a:p>
+        </p:txBody>
+      </p:sp>
+      <p:sp>
+        <p:nvSpPr>
+          <p:cNvPr id="8" name="TextBox 92">
+            <a:extLst>
+              <a:ext uri="{FF2B5EF4-FFF2-40B4-BE49-F238E27FC236}">
+                <a16:creationId xmlns:a16="http://schemas.microsoft.com/office/drawing/2014/main" id="{F8E365B0-9B32-B7E4-13DF-93690B5BFC51}"/>
+              </a:ext>
+            </a:extLst>
+          </p:cNvPr>
+          <p:cNvSpPr txBox="1"/>
+          <p:nvPr/>
+        </p:nvSpPr>
+        <p:spPr>
+          <a:xfrm>
+            <a:off x="1658622" y="-32996"/>
+            <a:ext cx="2556411" cy="276999"/>
+          </a:xfrm>
+          <a:prstGeom prst="rect">
+            <a:avLst/>
+          </a:prstGeom>
+          <a:noFill/>
+        </p:spPr>
+        <p:txBody>
+          <a:bodyPr rot="0" spcFirstLastPara="0" vertOverflow="overflow" horzOverflow="overflow" vert="horz" wrap="square" lIns="91440" tIns="45720" rIns="91440" bIns="45720" numCol="1" spcCol="0" rtlCol="0" fromWordArt="0" anchor="t" anchorCtr="0" forceAA="0" compatLnSpc="1">
+            <a:prstTxWarp prst="textNoShape">
+              <a:avLst/>
+            </a:prstTxWarp>
+            <a:spAutoFit/>
+          </a:bodyPr>
+          <a:lstStyle/>
+          <a:p>
+            <a:pPr algn="ctr"/>
+            <a:r>
+              <a:rPr lang="en-US" sz="1200" u="sng" noProof="0" dirty="0"/>
+              <a:t>Object detection and localization</a:t>
+            </a:r>
+          </a:p>
+        </p:txBody>
+      </p:sp>
+      <p:pic>
+        <p:nvPicPr>
+          <p:cNvPr id="12" name="Grafik 11" descr="Chat Silhouette">
+            <a:extLst>
+              <a:ext uri="{FF2B5EF4-FFF2-40B4-BE49-F238E27FC236}">
+                <a16:creationId xmlns:a16="http://schemas.microsoft.com/office/drawing/2014/main" id="{B9B0C987-16BF-20BC-29EE-E31A1F64D423}"/>
+              </a:ext>
+            </a:extLst>
+          </p:cNvPr>
+          <p:cNvPicPr>
+            <a:picLocks noChangeAspect="1"/>
+          </p:cNvPicPr>
+          <p:nvPr/>
+        </p:nvPicPr>
+        <p:blipFill>
+          <a:blip r:embed="rId7">
+            <a:extLst>
+              <a:ext uri="{96DAC541-7B7A-43D3-8B79-37D633B846F1}">
+                <asvg:svgBlip xmlns:asvg="http://schemas.microsoft.com/office/drawing/2016/SVG/main" r:embed="rId8"/>
+              </a:ext>
+            </a:extLst>
+          </a:blip>
+          <a:stretch>
+            <a:fillRect/>
+          </a:stretch>
+        </p:blipFill>
+        <p:spPr>
+          <a:xfrm>
+            <a:off x="1057861" y="721463"/>
+            <a:ext cx="914400" cy="914400"/>
+          </a:xfrm>
+          <a:prstGeom prst="rect">
+            <a:avLst/>
+          </a:prstGeom>
+        </p:spPr>
+      </p:pic>
+      <p:sp>
+        <p:nvSpPr>
+          <p:cNvPr id="13" name="Sprechblase: rechteckig 12">
+            <a:extLst>
+              <a:ext uri="{FF2B5EF4-FFF2-40B4-BE49-F238E27FC236}">
+                <a16:creationId xmlns:a16="http://schemas.microsoft.com/office/drawing/2014/main" id="{2B642F09-FD3C-3BEA-E1FA-36A811CEA4F4}"/>
+              </a:ext>
+            </a:extLst>
+          </p:cNvPr>
+          <p:cNvSpPr/>
+          <p:nvPr/>
+        </p:nvSpPr>
+        <p:spPr>
+          <a:xfrm>
+            <a:off x="9507363" y="273888"/>
+            <a:ext cx="2651999" cy="1840117"/>
+          </a:xfrm>
+          <a:prstGeom prst="wedgeRectCallout">
+            <a:avLst>
+              <a:gd name="adj1" fmla="val -71425"/>
+              <a:gd name="adj2" fmla="val 23013"/>
+            </a:avLst>
+          </a:prstGeom>
+          <a:noFill/>
+          <a:ln>
+            <a:solidFill>
+              <a:schemeClr val="tx1"/>
+            </a:solidFill>
+          </a:ln>
+        </p:spPr>
+        <p:style>
+          <a:lnRef idx="2">
+            <a:schemeClr val="accent1">
+              <a:shade val="15000"/>
+            </a:schemeClr>
+          </a:lnRef>
+          <a:fillRef idx="1">
+            <a:schemeClr val="accent1"/>
+          </a:fillRef>
+          <a:effectRef idx="0">
+            <a:schemeClr val="accent1"/>
+          </a:effectRef>
+          <a:fontRef idx="minor">
+            <a:schemeClr val="lt1"/>
+          </a:fontRef>
+        </p:style>
+        <p:txBody>
+          <a:bodyPr rtlCol="0" anchor="ctr"/>
+          <a:lstStyle/>
+          <a:p>
+            <a:r>
+              <a:rPr lang="en-US" sz="1200" noProof="0" dirty="0">
+                <a:solidFill>
+                  <a:schemeClr val="accent1"/>
+                </a:solidFill>
+              </a:rPr>
+              <a:t>a. “There is a car in front of you, 5 meters away.”</a:t>
+            </a:r>
+          </a:p>
+          <a:p>
+            <a:r>
+              <a:rPr lang="en-US" sz="1200" noProof="0" dirty="0">
+                <a:solidFill>
+                  <a:schemeClr val="accent5"/>
+                </a:solidFill>
+              </a:rPr>
+              <a:t>d. “Sure, you can give me voice commands to analyze the scene for a blind person, for example, or you can tell me a navigation destination in my field of vision that I should drive to,</a:t>
+            </a:r>
+            <a:r>
+              <a:rPr lang="en-US" sz="1200" dirty="0">
+                <a:solidFill>
+                  <a:schemeClr val="accent5"/>
+                </a:solidFill>
+              </a:rPr>
+              <a:t> or I can follow any recognized object by YOLO!</a:t>
+            </a:r>
+            <a:r>
+              <a:rPr lang="en-US" sz="1200" noProof="0" dirty="0">
+                <a:solidFill>
+                  <a:schemeClr val="accent5"/>
+                </a:solidFill>
+              </a:rPr>
+              <a:t>”</a:t>
+            </a:r>
+          </a:p>
+        </p:txBody>
+      </p:sp>
+      <p:sp>
+        <p:nvSpPr>
+          <p:cNvPr id="16" name="TextBox 92">
+            <a:extLst>
+              <a:ext uri="{FF2B5EF4-FFF2-40B4-BE49-F238E27FC236}">
+                <a16:creationId xmlns:a16="http://schemas.microsoft.com/office/drawing/2014/main" id="{BF3BDE9D-39AD-FB9E-2DDD-5EFE3F8A04D4}"/>
+              </a:ext>
+            </a:extLst>
+          </p:cNvPr>
+          <p:cNvSpPr txBox="1"/>
+          <p:nvPr/>
+        </p:nvSpPr>
+        <p:spPr>
+          <a:xfrm>
+            <a:off x="7402637" y="2227905"/>
+            <a:ext cx="2489760" cy="461665"/>
+          </a:xfrm>
+          <a:prstGeom prst="rect">
+            <a:avLst/>
+          </a:prstGeom>
+          <a:noFill/>
+        </p:spPr>
+        <p:txBody>
+          <a:bodyPr rot="0" spcFirstLastPara="0" vertOverflow="overflow" horzOverflow="overflow" vert="horz" wrap="square" lIns="91440" tIns="45720" rIns="91440" bIns="45720" numCol="1" spcCol="0" rtlCol="0" fromWordArt="0" anchor="t" anchorCtr="0" forceAA="0" compatLnSpc="1">
+            <a:prstTxWarp prst="textNoShape">
+              <a:avLst/>
+            </a:prstTxWarp>
+            <a:spAutoFit/>
+          </a:bodyPr>
+          <a:lstStyle/>
+          <a:p>
+            <a:pPr algn="ctr"/>
+            <a:r>
+              <a:rPr lang="en-US" sz="1200" noProof="0" dirty="0"/>
+              <a:t>Rule-based answer and action</a:t>
+            </a:r>
+            <a:br>
+              <a:rPr lang="en-US" sz="1200" noProof="0" dirty="0"/>
+            </a:br>
+            <a:endParaRPr lang="en-US" sz="1200" noProof="0" dirty="0"/>
+          </a:p>
+        </p:txBody>
+      </p:sp>
+      <p:sp>
+        <p:nvSpPr>
+          <p:cNvPr id="17" name="TextBox 92">
+            <a:extLst>
+              <a:ext uri="{FF2B5EF4-FFF2-40B4-BE49-F238E27FC236}">
+                <a16:creationId xmlns:a16="http://schemas.microsoft.com/office/drawing/2014/main" id="{525A790D-296D-0695-7B76-363285D15B7B}"/>
+              </a:ext>
+            </a:extLst>
+          </p:cNvPr>
+          <p:cNvSpPr txBox="1"/>
+          <p:nvPr/>
+        </p:nvSpPr>
+        <p:spPr>
+          <a:xfrm>
+            <a:off x="7369312" y="0"/>
+            <a:ext cx="2556411" cy="276999"/>
+          </a:xfrm>
+          <a:prstGeom prst="rect">
+            <a:avLst/>
+          </a:prstGeom>
+          <a:noFill/>
+        </p:spPr>
+        <p:txBody>
+          <a:bodyPr rot="0" spcFirstLastPara="0" vertOverflow="overflow" horzOverflow="overflow" vert="horz" wrap="square" lIns="91440" tIns="45720" rIns="91440" bIns="45720" numCol="1" spcCol="0" rtlCol="0" fromWordArt="0" anchor="t" anchorCtr="0" forceAA="0" compatLnSpc="1">
+            <a:prstTxWarp prst="textNoShape">
+              <a:avLst/>
+            </a:prstTxWarp>
+            <a:spAutoFit/>
+          </a:bodyPr>
+          <a:lstStyle/>
+          <a:p>
+            <a:pPr algn="ctr"/>
+            <a:r>
+              <a:rPr lang="en-US" sz="1200" u="sng" noProof="0" dirty="0"/>
+              <a:t>Hybrid voice assistant (TTS)</a:t>
+            </a:r>
+          </a:p>
+        </p:txBody>
+      </p:sp>
+      <p:sp>
+        <p:nvSpPr>
+          <p:cNvPr id="18" name="Sprechblase: oval 17">
+            <a:extLst>
+              <a:ext uri="{FF2B5EF4-FFF2-40B4-BE49-F238E27FC236}">
+                <a16:creationId xmlns:a16="http://schemas.microsoft.com/office/drawing/2014/main" id="{4C0BCE2F-AD65-2A70-923B-3824F3C0C33E}"/>
+              </a:ext>
+            </a:extLst>
+          </p:cNvPr>
+          <p:cNvSpPr/>
+          <p:nvPr/>
+        </p:nvSpPr>
+        <p:spPr>
+          <a:xfrm>
+            <a:off x="9507362" y="2283338"/>
+            <a:ext cx="2651999" cy="1557040"/>
+          </a:xfrm>
+          <a:prstGeom prst="wedgeEllipseCallout">
+            <a:avLst>
+              <a:gd name="adj1" fmla="val -60308"/>
+              <a:gd name="adj2" fmla="val -5285"/>
+            </a:avLst>
+          </a:prstGeom>
+          <a:noFill/>
+        </p:spPr>
+        <p:style>
+          <a:lnRef idx="2">
+            <a:schemeClr val="accent1">
+              <a:shade val="15000"/>
+            </a:schemeClr>
+          </a:lnRef>
+          <a:fillRef idx="1">
+            <a:schemeClr val="accent1"/>
+          </a:fillRef>
+          <a:effectRef idx="0">
+            <a:schemeClr val="accent1"/>
+          </a:effectRef>
+          <a:fontRef idx="minor">
+            <a:schemeClr val="lt1"/>
+          </a:fontRef>
+        </p:style>
+        <p:txBody>
+          <a:bodyPr rtlCol="0" anchor="ctr"/>
+          <a:lstStyle/>
+          <a:p>
+            <a:pPr algn="ctr"/>
+            <a:r>
+              <a:rPr lang="en-US" sz="1200" noProof="0" dirty="0">
+                <a:solidFill>
+                  <a:schemeClr val="accent2"/>
+                </a:solidFill>
+              </a:rPr>
+              <a:t>b. “I will drive to object ABC.... Destination reached!”</a:t>
+            </a:r>
+          </a:p>
+          <a:p>
+            <a:pPr algn="ctr"/>
+            <a:r>
+              <a:rPr lang="en-US" sz="1200" noProof="0" dirty="0">
+                <a:solidFill>
+                  <a:schemeClr val="accent6"/>
+                </a:solidFill>
+              </a:rPr>
+              <a:t>c. “My left motor temperature is 25 °C and my right motor temperature is 26 °C.”</a:t>
+            </a:r>
+          </a:p>
+        </p:txBody>
+      </p:sp>
+      <p:sp>
+        <p:nvSpPr>
+          <p:cNvPr id="19" name="Geschweifte Klammer rechts 18">
+            <a:extLst>
+              <a:ext uri="{FF2B5EF4-FFF2-40B4-BE49-F238E27FC236}">
+                <a16:creationId xmlns:a16="http://schemas.microsoft.com/office/drawing/2014/main" id="{697138CF-01EC-0CD0-E73C-020B6B7F0778}"/>
+              </a:ext>
+            </a:extLst>
+          </p:cNvPr>
+          <p:cNvSpPr/>
+          <p:nvPr/>
+        </p:nvSpPr>
+        <p:spPr>
+          <a:xfrm>
+            <a:off x="3753385" y="826895"/>
+            <a:ext cx="1081159" cy="2202055"/>
+          </a:xfrm>
+          <a:prstGeom prst="rightBrace">
+            <a:avLst>
+              <a:gd name="adj1" fmla="val 8333"/>
+              <a:gd name="adj2" fmla="val 52699"/>
+            </a:avLst>
+          </a:prstGeom>
+          <a:ln>
+            <a:solidFill>
+              <a:schemeClr val="bg2">
+                <a:lumMod val="50000"/>
+              </a:schemeClr>
+            </a:solidFill>
+          </a:ln>
+        </p:spPr>
+        <p:style>
+          <a:lnRef idx="2">
+            <a:schemeClr val="accent1"/>
+          </a:lnRef>
+          <a:fillRef idx="0">
+            <a:schemeClr val="accent1"/>
+          </a:fillRef>
+          <a:effectRef idx="1">
+            <a:schemeClr val="accent1"/>
+          </a:effectRef>
+          <a:fontRef idx="minor">
+            <a:schemeClr val="tx1"/>
+          </a:fontRef>
+        </p:style>
+        <p:txBody>
+          <a:bodyPr rtlCol="0" anchor="ctr"/>
+          <a:lstStyle/>
+          <a:p>
+            <a:pPr algn="ctr"/>
+            <a:endParaRPr lang="en-US" noProof="0" dirty="0"/>
+          </a:p>
+        </p:txBody>
+      </p:sp>
+      <p:sp>
+        <p:nvSpPr>
+          <p:cNvPr id="32" name="TextBox 92">
+            <a:extLst>
+              <a:ext uri="{FF2B5EF4-FFF2-40B4-BE49-F238E27FC236}">
+                <a16:creationId xmlns:a16="http://schemas.microsoft.com/office/drawing/2014/main" id="{C2A1BFD3-BC29-A136-3211-B47DEA51B4C6}"/>
+              </a:ext>
+            </a:extLst>
+          </p:cNvPr>
+          <p:cNvSpPr txBox="1"/>
+          <p:nvPr/>
+        </p:nvSpPr>
+        <p:spPr>
+          <a:xfrm>
+            <a:off x="4600276" y="0"/>
+            <a:ext cx="2556411" cy="276999"/>
+          </a:xfrm>
+          <a:prstGeom prst="rect">
+            <a:avLst/>
+          </a:prstGeom>
+          <a:noFill/>
+        </p:spPr>
+        <p:txBody>
+          <a:bodyPr rot="0" spcFirstLastPara="0" vertOverflow="overflow" horzOverflow="overflow" vert="horz" wrap="square" lIns="91440" tIns="45720" rIns="91440" bIns="45720" numCol="1" spcCol="0" rtlCol="0" fromWordArt="0" anchor="t" anchorCtr="0" forceAA="0" compatLnSpc="1">
+            <a:prstTxWarp prst="textNoShape">
+              <a:avLst/>
+            </a:prstTxWarp>
+            <a:spAutoFit/>
+          </a:bodyPr>
+          <a:lstStyle/>
+          <a:p>
+            <a:pPr algn="ctr"/>
+            <a:r>
+              <a:rPr lang="en-US" sz="1200" u="sng" noProof="0" dirty="0"/>
+              <a:t>Intent analyzer</a:t>
+            </a:r>
+          </a:p>
+        </p:txBody>
+      </p:sp>
+      <p:sp>
+        <p:nvSpPr>
+          <p:cNvPr id="33" name="Flussdiagramm: Verzweigung 32">
+            <a:extLst>
+              <a:ext uri="{FF2B5EF4-FFF2-40B4-BE49-F238E27FC236}">
+                <a16:creationId xmlns:a16="http://schemas.microsoft.com/office/drawing/2014/main" id="{7C2651B6-C66A-84E6-05C0-FEB4D4986214}"/>
+              </a:ext>
+            </a:extLst>
+          </p:cNvPr>
+          <p:cNvSpPr/>
+          <p:nvPr/>
+        </p:nvSpPr>
+        <p:spPr>
+          <a:xfrm>
+            <a:off x="4848054" y="1405139"/>
+            <a:ext cx="1178847" cy="1159696"/>
+          </a:xfrm>
+          <a:prstGeom prst="flowChartDecision">
+            <a:avLst/>
+          </a:prstGeom>
+          <a:noFill/>
+          <a:ln>
+            <a:solidFill>
+              <a:schemeClr val="tx1"/>
+            </a:solidFill>
+          </a:ln>
+        </p:spPr>
+        <p:style>
+          <a:lnRef idx="2">
+            <a:schemeClr val="accent1">
+              <a:shade val="15000"/>
+            </a:schemeClr>
+          </a:lnRef>
+          <a:fillRef idx="1">
+            <a:schemeClr val="accent1"/>
+          </a:fillRef>
+          <a:effectRef idx="0">
+            <a:schemeClr val="accent1"/>
+          </a:effectRef>
+          <a:fontRef idx="minor">
+            <a:schemeClr val="lt1"/>
+          </a:fontRef>
+        </p:style>
+        <p:txBody>
+          <a:bodyPr rtlCol="0" anchor="ctr"/>
+          <a:lstStyle/>
+          <a:p>
+            <a:pPr algn="ctr"/>
+            <a:r>
+              <a:rPr lang="en-US" sz="1200" noProof="0" dirty="0">
+                <a:solidFill>
+                  <a:schemeClr val="tx1"/>
+                </a:solidFill>
+              </a:rPr>
+              <a:t>Intent</a:t>
+            </a:r>
+          </a:p>
+        </p:txBody>
+      </p:sp>
+      <p:cxnSp>
+        <p:nvCxnSpPr>
+          <p:cNvPr id="35" name="Gerade Verbindung mit Pfeil 34">
+            <a:extLst>
+              <a:ext uri="{FF2B5EF4-FFF2-40B4-BE49-F238E27FC236}">
+                <a16:creationId xmlns:a16="http://schemas.microsoft.com/office/drawing/2014/main" id="{F396832B-2C26-AEA6-A396-6940AD16260B}"/>
+              </a:ext>
+            </a:extLst>
+          </p:cNvPr>
+          <p:cNvCxnSpPr>
+            <a:cxnSpLocks/>
+          </p:cNvCxnSpPr>
+          <p:nvPr/>
+        </p:nvCxnSpPr>
+        <p:spPr>
+          <a:xfrm flipV="1">
+            <a:off x="5762625" y="1400582"/>
+            <a:ext cx="2511425" cy="324933"/>
+          </a:xfrm>
+          <a:prstGeom prst="straightConnector1">
+            <a:avLst/>
+          </a:prstGeom>
+          <a:ln>
+            <a:solidFill>
+              <a:schemeClr val="bg2">
+                <a:lumMod val="50000"/>
+              </a:schemeClr>
+            </a:solidFill>
+            <a:tailEnd type="triangle"/>
+          </a:ln>
+        </p:spPr>
+        <p:style>
+          <a:lnRef idx="2">
+            <a:schemeClr val="dk1"/>
+          </a:lnRef>
+          <a:fillRef idx="0">
+            <a:schemeClr val="dk1"/>
+          </a:fillRef>
+          <a:effectRef idx="1">
+            <a:schemeClr val="dk1"/>
+          </a:effectRef>
+          <a:fontRef idx="minor">
+            <a:schemeClr val="tx1"/>
+          </a:fontRef>
+        </p:style>
+      </p:cxnSp>
+      <p:cxnSp>
+        <p:nvCxnSpPr>
+          <p:cNvPr id="41" name="Gerade Verbindung mit Pfeil 40">
+            <a:extLst>
+              <a:ext uri="{FF2B5EF4-FFF2-40B4-BE49-F238E27FC236}">
+                <a16:creationId xmlns:a16="http://schemas.microsoft.com/office/drawing/2014/main" id="{021DD32A-2327-A94C-89CD-22A53BB38BA9}"/>
+              </a:ext>
+            </a:extLst>
+          </p:cNvPr>
+          <p:cNvCxnSpPr>
+            <a:cxnSpLocks/>
+          </p:cNvCxnSpPr>
+          <p:nvPr/>
+        </p:nvCxnSpPr>
+        <p:spPr>
+          <a:xfrm>
+            <a:off x="5721350" y="2289191"/>
+            <a:ext cx="2468968" cy="603224"/>
+          </a:xfrm>
+          <a:prstGeom prst="straightConnector1">
+            <a:avLst/>
+          </a:prstGeom>
+          <a:ln>
+            <a:solidFill>
+              <a:schemeClr val="bg2">
+                <a:lumMod val="50000"/>
+              </a:schemeClr>
+            </a:solidFill>
+            <a:tailEnd type="triangle"/>
+          </a:ln>
+        </p:spPr>
+        <p:style>
+          <a:lnRef idx="2">
+            <a:schemeClr val="dk1"/>
+          </a:lnRef>
+          <a:fillRef idx="0">
+            <a:schemeClr val="dk1"/>
+          </a:fillRef>
+          <a:effectRef idx="1">
+            <a:schemeClr val="dk1"/>
+          </a:effectRef>
+          <a:fontRef idx="minor">
+            <a:schemeClr val="tx1"/>
+          </a:fontRef>
+        </p:style>
+      </p:cxnSp>
+      <p:sp>
+        <p:nvSpPr>
+          <p:cNvPr id="42" name="Textfeld 41">
+            <a:extLst>
+              <a:ext uri="{FF2B5EF4-FFF2-40B4-BE49-F238E27FC236}">
+                <a16:creationId xmlns:a16="http://schemas.microsoft.com/office/drawing/2014/main" id="{991F869B-CF71-74EA-8D4E-CA8832B2DA38}"/>
+              </a:ext>
+            </a:extLst>
+          </p:cNvPr>
+          <p:cNvSpPr txBox="1"/>
+          <p:nvPr/>
+        </p:nvSpPr>
+        <p:spPr>
+          <a:xfrm>
+            <a:off x="6275592" y="1328943"/>
+            <a:ext cx="835485" cy="246221"/>
+          </a:xfrm>
+          <a:prstGeom prst="rect">
+            <a:avLst/>
+          </a:prstGeom>
+          <a:noFill/>
+        </p:spPr>
+        <p:txBody>
+          <a:bodyPr wrap="none" rtlCol="0">
+            <a:spAutoFit/>
+          </a:bodyPr>
+          <a:lstStyle/>
+          <a:p>
+            <a:r>
+              <a:rPr lang="en-US" sz="1000" noProof="0" dirty="0"/>
+              <a:t>AI request? </a:t>
+            </a:r>
+          </a:p>
+        </p:txBody>
+      </p:sp>
+      <p:sp>
+        <p:nvSpPr>
+          <p:cNvPr id="43" name="Textfeld 42">
+            <a:extLst>
+              <a:ext uri="{FF2B5EF4-FFF2-40B4-BE49-F238E27FC236}">
+                <a16:creationId xmlns:a16="http://schemas.microsoft.com/office/drawing/2014/main" id="{86B19309-1E84-7BF8-6CEF-ABB5F80C535E}"/>
+              </a:ext>
+            </a:extLst>
+          </p:cNvPr>
+          <p:cNvSpPr txBox="1"/>
+          <p:nvPr/>
+        </p:nvSpPr>
+        <p:spPr>
+          <a:xfrm>
+            <a:off x="5771559" y="2644258"/>
+            <a:ext cx="1739579" cy="553998"/>
+          </a:xfrm>
+          <a:prstGeom prst="rect">
+            <a:avLst/>
+          </a:prstGeom>
+          <a:noFill/>
+        </p:spPr>
+        <p:txBody>
+          <a:bodyPr wrap="none" rtlCol="0">
+            <a:spAutoFit/>
+          </a:bodyPr>
+          <a:lstStyle/>
+          <a:p>
+            <a:pPr algn="ctr"/>
+            <a:r>
+              <a:rPr lang="en-US" sz="1000" noProof="0" dirty="0"/>
+              <a:t>Direct navigation command </a:t>
+            </a:r>
+            <a:br>
+              <a:rPr lang="en-US" sz="1000" noProof="0" dirty="0"/>
+            </a:br>
+            <a:r>
+              <a:rPr lang="en-US" sz="1000" b="1" noProof="0" dirty="0"/>
+              <a:t>or</a:t>
+            </a:r>
+            <a:r>
+              <a:rPr lang="en-US" sz="1000" noProof="0" dirty="0"/>
+              <a:t> </a:t>
+            </a:r>
+            <a:br>
+              <a:rPr lang="en-US" sz="1000" noProof="0" dirty="0"/>
+            </a:br>
+            <a:r>
+              <a:rPr lang="en-US" sz="1000" noProof="0" dirty="0"/>
+              <a:t>system status query?</a:t>
+            </a:r>
+          </a:p>
+        </p:txBody>
+      </p:sp>
+      <p:pic>
+        <p:nvPicPr>
+          <p:cNvPr id="46" name="Grafik 45" descr="Ein Bild, das Entwurf, Zeichnung, Handschrift, Kunst enthält.&#10;&#10;KI-generierte Inhalte können fehlerhaft sein.">
+            <a:extLst>
+              <a:ext uri="{FF2B5EF4-FFF2-40B4-BE49-F238E27FC236}">
+                <a16:creationId xmlns:a16="http://schemas.microsoft.com/office/drawing/2014/main" id="{14FC6C09-2B06-513E-ECF1-1CA4A2F42A36}"/>
+              </a:ext>
+            </a:extLst>
+          </p:cNvPr>
+          <p:cNvPicPr>
+            <a:picLocks noChangeAspect="1"/>
+          </p:cNvPicPr>
+          <p:nvPr/>
+        </p:nvPicPr>
+        <p:blipFill>
+          <a:blip r:embed="rId9"/>
+          <a:stretch>
+            <a:fillRect/>
+          </a:stretch>
+        </p:blipFill>
+        <p:spPr>
+          <a:xfrm>
+            <a:off x="7160628" y="4827643"/>
+            <a:ext cx="3888180" cy="1925793"/>
+          </a:xfrm>
+          <a:prstGeom prst="rect">
+            <a:avLst/>
+          </a:prstGeom>
+        </p:spPr>
+      </p:pic>
+      <p:pic>
+        <p:nvPicPr>
+          <p:cNvPr id="49" name="Grafik 48" descr="Ein Bild, das Schrift, Logo, Grafiken, Symbol enthält.&#10;&#10;KI-generierte Inhalte können fehlerhaft sein.">
+            <a:extLst>
+              <a:ext uri="{FF2B5EF4-FFF2-40B4-BE49-F238E27FC236}">
+                <a16:creationId xmlns:a16="http://schemas.microsoft.com/office/drawing/2014/main" id="{78833A89-BECD-9C82-EBE6-9E5426EEFD99}"/>
+              </a:ext>
+            </a:extLst>
+          </p:cNvPr>
+          <p:cNvPicPr>
+            <a:picLocks noChangeAspect="1"/>
+          </p:cNvPicPr>
+          <p:nvPr/>
+        </p:nvPicPr>
+        <p:blipFill>
+          <a:blip r:embed="rId10"/>
+          <a:stretch>
+            <a:fillRect/>
+          </a:stretch>
+        </p:blipFill>
+        <p:spPr>
+          <a:xfrm>
+            <a:off x="7822768" y="4600720"/>
+            <a:ext cx="1871056" cy="433385"/>
+          </a:xfrm>
+          <a:prstGeom prst="rect">
+            <a:avLst/>
+          </a:prstGeom>
+        </p:spPr>
+      </p:pic>
+      <p:cxnSp>
+        <p:nvCxnSpPr>
+          <p:cNvPr id="57" name="Gerade Verbindung mit Pfeil 56">
+            <a:extLst>
+              <a:ext uri="{FF2B5EF4-FFF2-40B4-BE49-F238E27FC236}">
+                <a16:creationId xmlns:a16="http://schemas.microsoft.com/office/drawing/2014/main" id="{C6A0DCB3-B4B7-AD78-D132-8569E859B219}"/>
+              </a:ext>
+            </a:extLst>
+          </p:cNvPr>
+          <p:cNvCxnSpPr>
+            <a:cxnSpLocks/>
+          </p:cNvCxnSpPr>
+          <p:nvPr/>
+        </p:nvCxnSpPr>
+        <p:spPr>
+          <a:xfrm>
+            <a:off x="8442215" y="3378279"/>
+            <a:ext cx="8523" cy="1166465"/>
+          </a:xfrm>
+          <a:prstGeom prst="straightConnector1">
+            <a:avLst/>
+          </a:prstGeom>
+          <a:ln>
+            <a:solidFill>
+              <a:schemeClr val="accent2"/>
+            </a:solidFill>
+            <a:headEnd type="triangle"/>
+            <a:tailEnd type="triangle"/>
+          </a:ln>
+        </p:spPr>
+        <p:style>
+          <a:lnRef idx="2">
+            <a:schemeClr val="accent1"/>
+          </a:lnRef>
+          <a:fillRef idx="0">
+            <a:schemeClr val="accent1"/>
+          </a:fillRef>
+          <a:effectRef idx="1">
+            <a:schemeClr val="accent1"/>
+          </a:effectRef>
+          <a:fontRef idx="minor">
+            <a:schemeClr val="tx1"/>
+          </a:fontRef>
+        </p:style>
+      </p:cxnSp>
+      <p:cxnSp>
+        <p:nvCxnSpPr>
+          <p:cNvPr id="60" name="Gerade Verbindung mit Pfeil 59">
+            <a:extLst>
+              <a:ext uri="{FF2B5EF4-FFF2-40B4-BE49-F238E27FC236}">
+                <a16:creationId xmlns:a16="http://schemas.microsoft.com/office/drawing/2014/main" id="{87D0D3AE-3D18-86F6-809A-CF49AE4FE1E0}"/>
+              </a:ext>
+            </a:extLst>
+          </p:cNvPr>
+          <p:cNvCxnSpPr>
+            <a:cxnSpLocks/>
+          </p:cNvCxnSpPr>
+          <p:nvPr/>
+        </p:nvCxnSpPr>
+        <p:spPr>
+          <a:xfrm>
+            <a:off x="8843376" y="3378280"/>
+            <a:ext cx="13901" cy="1166465"/>
+          </a:xfrm>
+          <a:prstGeom prst="straightConnector1">
+            <a:avLst/>
+          </a:prstGeom>
+          <a:ln>
+            <a:solidFill>
+              <a:schemeClr val="accent6"/>
+            </a:solidFill>
+            <a:headEnd type="triangle"/>
+            <a:tailEnd type="triangle"/>
+          </a:ln>
+        </p:spPr>
+        <p:style>
+          <a:lnRef idx="2">
+            <a:schemeClr val="accent1"/>
+          </a:lnRef>
+          <a:fillRef idx="0">
+            <a:schemeClr val="accent1"/>
+          </a:fillRef>
+          <a:effectRef idx="1">
+            <a:schemeClr val="accent1"/>
+          </a:effectRef>
+          <a:fontRef idx="minor">
+            <a:schemeClr val="tx1"/>
+          </a:fontRef>
+        </p:style>
+      </p:cxnSp>
+      <p:sp>
+        <p:nvSpPr>
+          <p:cNvPr id="63" name="TextBox 92">
+            <a:extLst>
+              <a:ext uri="{FF2B5EF4-FFF2-40B4-BE49-F238E27FC236}">
+                <a16:creationId xmlns:a16="http://schemas.microsoft.com/office/drawing/2014/main" id="{5768F72A-941D-C93E-6B22-23D2FEDBFAD2}"/>
+              </a:ext>
+            </a:extLst>
+          </p:cNvPr>
+          <p:cNvSpPr txBox="1"/>
+          <p:nvPr/>
+        </p:nvSpPr>
+        <p:spPr>
+          <a:xfrm>
+            <a:off x="9096194" y="4009712"/>
+            <a:ext cx="2556411" cy="400110"/>
+          </a:xfrm>
+          <a:prstGeom prst="rect">
+            <a:avLst/>
+          </a:prstGeom>
+          <a:noFill/>
+        </p:spPr>
+        <p:txBody>
+          <a:bodyPr rot="0" spcFirstLastPara="0" vertOverflow="overflow" horzOverflow="overflow" vert="horz" wrap="square" lIns="91440" tIns="45720" rIns="91440" bIns="45720" numCol="1" spcCol="0" rtlCol="0" fromWordArt="0" anchor="t" anchorCtr="0" forceAA="0" compatLnSpc="1">
+            <a:prstTxWarp prst="textNoShape">
+              <a:avLst/>
+            </a:prstTxWarp>
+            <a:spAutoFit/>
+          </a:bodyPr>
+          <a:lstStyle/>
+          <a:p>
+            <a:pPr algn="ctr"/>
+            <a:r>
+              <a:rPr lang="en-US" sz="1000" dirty="0"/>
+              <a:t>Write and subscribe to ROS2 topics to drive or query status</a:t>
+            </a:r>
+            <a:endParaRPr lang="en-US" sz="1000" noProof="0" dirty="0"/>
+          </a:p>
+        </p:txBody>
+      </p:sp>
+      <p:sp>
+        <p:nvSpPr>
+          <p:cNvPr id="64" name="Additionszeichen 63">
+            <a:extLst>
+              <a:ext uri="{FF2B5EF4-FFF2-40B4-BE49-F238E27FC236}">
+                <a16:creationId xmlns:a16="http://schemas.microsoft.com/office/drawing/2014/main" id="{EB7C1841-26B7-123C-D187-DC76A6DB50F5}"/>
+              </a:ext>
+            </a:extLst>
+          </p:cNvPr>
+          <p:cNvSpPr/>
+          <p:nvPr/>
+        </p:nvSpPr>
+        <p:spPr>
+          <a:xfrm>
+            <a:off x="2684637" y="1592169"/>
+            <a:ext cx="558181" cy="584520"/>
+          </a:xfrm>
+          <a:prstGeom prst="mathPlus">
+            <a:avLst/>
+          </a:prstGeom>
+          <a:solidFill>
+            <a:srgbClr val="FF0000"/>
+          </a:solidFill>
+          <a:ln>
+            <a:solidFill>
+              <a:schemeClr val="bg1"/>
+            </a:solidFill>
+          </a:ln>
+        </p:spPr>
+        <p:style>
+          <a:lnRef idx="2">
+            <a:schemeClr val="accent3">
+              <a:shade val="15000"/>
+            </a:schemeClr>
+          </a:lnRef>
+          <a:fillRef idx="1">
+            <a:schemeClr val="accent3"/>
+          </a:fillRef>
+          <a:effectRef idx="0">
+            <a:schemeClr val="accent3"/>
+          </a:effectRef>
+          <a:fontRef idx="minor">
+            <a:schemeClr val="lt1"/>
+          </a:fontRef>
+        </p:style>
+        <p:txBody>
+          <a:bodyPr rtlCol="0" anchor="ctr"/>
+          <a:lstStyle/>
+          <a:p>
+            <a:pPr algn="ctr"/>
+            <a:endParaRPr lang="de-DE"/>
+          </a:p>
+        </p:txBody>
+      </p:sp>
+      <p:pic>
+        <p:nvPicPr>
+          <p:cNvPr id="6" name="Grafik 5" descr="Ein Bild, das Screenshot, Text, Multimedia-Software, Grafiksoftware enthält.&#10;&#10;KI-generierte Inhalte können fehlerhaft sein.">
+            <a:extLst>
+              <a:ext uri="{FF2B5EF4-FFF2-40B4-BE49-F238E27FC236}">
+                <a16:creationId xmlns:a16="http://schemas.microsoft.com/office/drawing/2014/main" id="{E2D1C7C5-BB37-449E-EE08-19653E5C89F9}"/>
+              </a:ext>
+            </a:extLst>
+          </p:cNvPr>
+          <p:cNvPicPr>
+            <a:picLocks noChangeAspect="1"/>
+          </p:cNvPicPr>
+          <p:nvPr/>
+        </p:nvPicPr>
+        <p:blipFill>
+          <a:blip r:embed="rId11" cstate="print">
+            <a:extLst>
+              <a:ext uri="{28A0092B-C50C-407E-A947-70E740481C1C}">
+                <a14:useLocalDpi xmlns:a14="http://schemas.microsoft.com/office/drawing/2010/main" val="0"/>
+              </a:ext>
+            </a:extLst>
+          </a:blip>
+          <a:stretch>
+            <a:fillRect/>
+          </a:stretch>
+        </p:blipFill>
+        <p:spPr>
+          <a:xfrm>
+            <a:off x="1143192" y="3829051"/>
+            <a:ext cx="5316255" cy="2991562"/>
+          </a:xfrm>
+          <a:prstGeom prst="rect">
+            <a:avLst/>
+          </a:prstGeom>
+        </p:spPr>
+      </p:pic>
+      <p:pic>
+        <p:nvPicPr>
+          <p:cNvPr id="25" name="Grafik 24" descr="Pfeil: Kurve im Uhrzeigersinn mit einfarbiger Füllung">
+            <a:extLst>
+              <a:ext uri="{FF2B5EF4-FFF2-40B4-BE49-F238E27FC236}">
+                <a16:creationId xmlns:a16="http://schemas.microsoft.com/office/drawing/2014/main" id="{ADC1DA14-EA72-E8CE-33AF-D4D58D64373D}"/>
+              </a:ext>
+            </a:extLst>
+          </p:cNvPr>
+          <p:cNvPicPr>
+            <a:picLocks noChangeAspect="1"/>
+          </p:cNvPicPr>
+          <p:nvPr/>
+        </p:nvPicPr>
+        <p:blipFill>
+          <a:blip r:embed="rId12">
+            <a:extLst>
+              <a:ext uri="{96DAC541-7B7A-43D3-8B79-37D633B846F1}">
+                <asvg:svgBlip xmlns:asvg="http://schemas.microsoft.com/office/drawing/2016/SVG/main" r:embed="rId13"/>
+              </a:ext>
+            </a:extLst>
+          </a:blip>
+          <a:stretch>
+            <a:fillRect/>
+          </a:stretch>
+        </p:blipFill>
+        <p:spPr>
+          <a:xfrm rot="10800000">
+            <a:off x="1229960" y="1508219"/>
+            <a:ext cx="914400" cy="2502454"/>
+          </a:xfrm>
+          <a:prstGeom prst="rect">
+            <a:avLst/>
+          </a:prstGeom>
+        </p:spPr>
+      </p:pic>
+      <p:pic>
+        <p:nvPicPr>
+          <p:cNvPr id="37" name="Grafik 36" descr="Ein Bild, das Küchenutensilien, Design, Schwarzweiß enthält.&#10;&#10;KI-generierte Inhalte können fehlerhaft sein.">
+            <a:extLst>
+              <a:ext uri="{FF2B5EF4-FFF2-40B4-BE49-F238E27FC236}">
+                <a16:creationId xmlns:a16="http://schemas.microsoft.com/office/drawing/2014/main" id="{30E1B45F-077D-51D3-9C89-AE311E275810}"/>
+              </a:ext>
+            </a:extLst>
+          </p:cNvPr>
+          <p:cNvPicPr>
+            <a:picLocks noChangeAspect="1"/>
+          </p:cNvPicPr>
+          <p:nvPr/>
+        </p:nvPicPr>
+        <p:blipFill>
+          <a:blip r:embed="rId14"/>
+          <a:stretch>
+            <a:fillRect/>
+          </a:stretch>
+        </p:blipFill>
+        <p:spPr>
+          <a:xfrm>
+            <a:off x="8208855" y="2420182"/>
+            <a:ext cx="983570" cy="944466"/>
           </a:xfrm>
           <a:prstGeom prst="rect">
             <a:avLst/>
@@ -4793,7 +5688,7 @@
     </p:spTree>
     <p:extLst>
       <p:ext uri="{BB962C8B-B14F-4D97-AF65-F5344CB8AC3E}">
-        <p14:creationId xmlns:p14="http://schemas.microsoft.com/office/powerpoint/2010/main" val="123882738"/>
+        <p14:creationId xmlns:p14="http://schemas.microsoft.com/office/powerpoint/2010/main" val="714386815"/>
       </p:ext>
     </p:extLst>
   </p:cSld>

</xml_diff>

<commit_message>
added some context for the table (WIP)
</commit_message>
<xml_diff>
--- a/images/framework_architecture.pptx
+++ b/images/framework_architecture.pptx
@@ -876,6 +876,142 @@
     </pc:docChg>
   </pc:docChgLst>
   <pc:docChgLst>
+    <pc:chgData name="La, Trung Kien" userId="S::uas0015624@stud.fra-uas.de::a9b9c998-5aab-4e89-af6d-d527f5f74042" providerId="AD" clId="Web-{F33CC7AB-E154-C95B-89F4-AFE146238E40}"/>
+    <pc:docChg chg="modSld">
+      <pc:chgData name="La, Trung Kien" userId="S::uas0015624@stud.fra-uas.de::a9b9c998-5aab-4e89-af6d-d527f5f74042" providerId="AD" clId="Web-{F33CC7AB-E154-C95B-89F4-AFE146238E40}" dt="2025-08-20T15:56:28.065" v="65" actId="20577"/>
+      <pc:docMkLst>
+        <pc:docMk/>
+      </pc:docMkLst>
+      <pc:sldChg chg="addSp modSp">
+        <pc:chgData name="La, Trung Kien" userId="S::uas0015624@stud.fra-uas.de::a9b9c998-5aab-4e89-af6d-d527f5f74042" providerId="AD" clId="Web-{F33CC7AB-E154-C95B-89F4-AFE146238E40}" dt="2025-08-20T15:56:28.065" v="65" actId="20577"/>
+        <pc:sldMkLst>
+          <pc:docMk/>
+          <pc:sldMk cId="123882738" sldId="257"/>
+        </pc:sldMkLst>
+        <pc:spChg chg="add mod">
+          <ac:chgData name="La, Trung Kien" userId="S::uas0015624@stud.fra-uas.de::a9b9c998-5aab-4e89-af6d-d527f5f74042" providerId="AD" clId="Web-{F33CC7AB-E154-C95B-89F4-AFE146238E40}" dt="2025-08-20T14:50:41.752" v="55" actId="20577"/>
+          <ac:spMkLst>
+            <pc:docMk/>
+            <pc:sldMk cId="123882738" sldId="257"/>
+            <ac:spMk id="3" creationId="{6267AA7F-6DFF-8827-73FC-9A7665A60043}"/>
+          </ac:spMkLst>
+        </pc:spChg>
+        <pc:spChg chg="mod">
+          <ac:chgData name="La, Trung Kien" userId="S::uas0015624@stud.fra-uas.de::a9b9c998-5aab-4e89-af6d-d527f5f74042" providerId="AD" clId="Web-{F33CC7AB-E154-C95B-89F4-AFE146238E40}" dt="2025-08-20T14:50:09.984" v="44" actId="1076"/>
+          <ac:spMkLst>
+            <pc:docMk/>
+            <pc:sldMk cId="123882738" sldId="257"/>
+            <ac:spMk id="85" creationId="{B2863921-4AD7-2187-5169-B52887C5BB7C}"/>
+          </ac:spMkLst>
+        </pc:spChg>
+        <pc:spChg chg="mod">
+          <ac:chgData name="La, Trung Kien" userId="S::uas0015624@stud.fra-uas.de::a9b9c998-5aab-4e89-af6d-d527f5f74042" providerId="AD" clId="Web-{F33CC7AB-E154-C95B-89F4-AFE146238E40}" dt="2025-08-20T14:49:57.483" v="43" actId="20577"/>
+          <ac:spMkLst>
+            <pc:docMk/>
+            <pc:sldMk cId="123882738" sldId="257"/>
+            <ac:spMk id="86" creationId="{C2D1C9D3-15D1-E5B4-37C9-DC88D0B7A2ED}"/>
+          </ac:spMkLst>
+        </pc:spChg>
+        <pc:spChg chg="mod">
+          <ac:chgData name="La, Trung Kien" userId="S::uas0015624@stud.fra-uas.de::a9b9c998-5aab-4e89-af6d-d527f5f74042" providerId="AD" clId="Web-{F33CC7AB-E154-C95B-89F4-AFE146238E40}" dt="2025-08-20T13:17:37.841" v="9" actId="20577"/>
+          <ac:spMkLst>
+            <pc:docMk/>
+            <pc:sldMk cId="123882738" sldId="257"/>
+            <ac:spMk id="90" creationId="{43E92C48-8564-31B5-0335-EBECF33D63F6}"/>
+          </ac:spMkLst>
+        </pc:spChg>
+        <pc:spChg chg="mod">
+          <ac:chgData name="La, Trung Kien" userId="S::uas0015624@stud.fra-uas.de::a9b9c998-5aab-4e89-af6d-d527f5f74042" providerId="AD" clId="Web-{F33CC7AB-E154-C95B-89F4-AFE146238E40}" dt="2025-08-20T15:56:28.065" v="65" actId="20577"/>
+          <ac:spMkLst>
+            <pc:docMk/>
+            <pc:sldMk cId="123882738" sldId="257"/>
+            <ac:spMk id="103" creationId="{BB884518-C736-E829-4178-CF9FF26239F7}"/>
+          </ac:spMkLst>
+        </pc:spChg>
+        <pc:picChg chg="add mod">
+          <ac:chgData name="La, Trung Kien" userId="S::uas0015624@stud.fra-uas.de::a9b9c998-5aab-4e89-af6d-d527f5f74042" providerId="AD" clId="Web-{F33CC7AB-E154-C95B-89F4-AFE146238E40}" dt="2025-08-20T14:50:51.174" v="57" actId="1076"/>
+          <ac:picMkLst>
+            <pc:docMk/>
+            <pc:sldMk cId="123882738" sldId="257"/>
+            <ac:picMk id="2" creationId="{A9CBCC19-C54E-5060-9D10-DC56A7CD1714}"/>
+          </ac:picMkLst>
+        </pc:picChg>
+        <pc:picChg chg="mod">
+          <ac:chgData name="La, Trung Kien" userId="S::uas0015624@stud.fra-uas.de::a9b9c998-5aab-4e89-af6d-d527f5f74042" providerId="AD" clId="Web-{F33CC7AB-E154-C95B-89F4-AFE146238E40}" dt="2025-08-20T13:18:01.685" v="12" actId="1076"/>
+          <ac:picMkLst>
+            <pc:docMk/>
+            <pc:sldMk cId="123882738" sldId="257"/>
+            <ac:picMk id="72" creationId="{4072CEA9-0692-6817-5B1C-180EF110638E}"/>
+          </ac:picMkLst>
+        </pc:picChg>
+        <pc:picChg chg="mod">
+          <ac:chgData name="La, Trung Kien" userId="S::uas0015624@stud.fra-uas.de::a9b9c998-5aab-4e89-af6d-d527f5f74042" providerId="AD" clId="Web-{F33CC7AB-E154-C95B-89F4-AFE146238E40}" dt="2025-08-20T13:17:58.904" v="11" actId="1076"/>
+          <ac:picMkLst>
+            <pc:docMk/>
+            <pc:sldMk cId="123882738" sldId="257"/>
+            <ac:picMk id="74" creationId="{7DA6E27B-8B08-43AB-ECC8-8B9CA312E519}"/>
+          </ac:picMkLst>
+        </pc:picChg>
+        <pc:picChg chg="mod">
+          <ac:chgData name="La, Trung Kien" userId="S::uas0015624@stud.fra-uas.de::a9b9c998-5aab-4e89-af6d-d527f5f74042" providerId="AD" clId="Web-{F33CC7AB-E154-C95B-89F4-AFE146238E40}" dt="2025-08-20T13:18:05.013" v="14" actId="1076"/>
+          <ac:picMkLst>
+            <pc:docMk/>
+            <pc:sldMk cId="123882738" sldId="257"/>
+            <ac:picMk id="75" creationId="{2FA3A73D-8264-7740-3D88-D73E3F3AF308}"/>
+          </ac:picMkLst>
+        </pc:picChg>
+        <pc:picChg chg="mod">
+          <ac:chgData name="La, Trung Kien" userId="S::uas0015624@stud.fra-uas.de::a9b9c998-5aab-4e89-af6d-d527f5f74042" providerId="AD" clId="Web-{F33CC7AB-E154-C95B-89F4-AFE146238E40}" dt="2025-08-20T13:17:49.216" v="10" actId="1076"/>
+          <ac:picMkLst>
+            <pc:docMk/>
+            <pc:sldMk cId="123882738" sldId="257"/>
+            <ac:picMk id="77" creationId="{F4F72DDA-D17F-93CD-7AEA-FD6255737A90}"/>
+          </ac:picMkLst>
+        </pc:picChg>
+        <pc:cxnChg chg="mod">
+          <ac:chgData name="La, Trung Kien" userId="S::uas0015624@stud.fra-uas.de::a9b9c998-5aab-4e89-af6d-d527f5f74042" providerId="AD" clId="Web-{F33CC7AB-E154-C95B-89F4-AFE146238E40}" dt="2025-08-20T13:19:44.736" v="25" actId="14100"/>
+          <ac:cxnSpMkLst>
+            <pc:docMk/>
+            <pc:sldMk cId="123882738" sldId="257"/>
+            <ac:cxnSpMk id="58" creationId="{05EC3169-D325-6AC8-75B7-FA0F9B673D7F}"/>
+          </ac:cxnSpMkLst>
+        </pc:cxnChg>
+        <pc:cxnChg chg="mod">
+          <ac:chgData name="La, Trung Kien" userId="S::uas0015624@stud.fra-uas.de::a9b9c998-5aab-4e89-af6d-d527f5f74042" providerId="AD" clId="Web-{F33CC7AB-E154-C95B-89F4-AFE146238E40}" dt="2025-08-20T13:20:03.580" v="27" actId="1076"/>
+          <ac:cxnSpMkLst>
+            <pc:docMk/>
+            <pc:sldMk cId="123882738" sldId="257"/>
+            <ac:cxnSpMk id="60" creationId="{D50A15D9-7EB0-44F8-37FC-9DC604F58CBB}"/>
+          </ac:cxnSpMkLst>
+        </pc:cxnChg>
+        <pc:cxnChg chg="mod">
+          <ac:chgData name="La, Trung Kien" userId="S::uas0015624@stud.fra-uas.de::a9b9c998-5aab-4e89-af6d-d527f5f74042" providerId="AD" clId="Web-{F33CC7AB-E154-C95B-89F4-AFE146238E40}" dt="2025-08-20T15:56:27.706" v="64" actId="14100"/>
+          <ac:cxnSpMkLst>
+            <pc:docMk/>
+            <pc:sldMk cId="123882738" sldId="257"/>
+            <ac:cxnSpMk id="79" creationId="{EE5955F2-0C89-7E1E-306E-3B5F71CAFC20}"/>
+          </ac:cxnSpMkLst>
+        </pc:cxnChg>
+        <pc:cxnChg chg="mod">
+          <ac:chgData name="La, Trung Kien" userId="S::uas0015624@stud.fra-uas.de::a9b9c998-5aab-4e89-af6d-d527f5f74042" providerId="AD" clId="Web-{F33CC7AB-E154-C95B-89F4-AFE146238E40}" dt="2025-08-20T15:27:35.972" v="60" actId="1076"/>
+          <ac:cxnSpMkLst>
+            <pc:docMk/>
+            <pc:sldMk cId="123882738" sldId="257"/>
+            <ac:cxnSpMk id="96" creationId="{7ECD9DED-8324-55AC-554D-1298D880B0C4}"/>
+          </ac:cxnSpMkLst>
+        </pc:cxnChg>
+        <pc:cxnChg chg="mod">
+          <ac:chgData name="La, Trung Kien" userId="S::uas0015624@stud.fra-uas.de::a9b9c998-5aab-4e89-af6d-d527f5f74042" providerId="AD" clId="Web-{F33CC7AB-E154-C95B-89F4-AFE146238E40}" dt="2025-08-20T15:27:58.787" v="61" actId="1076"/>
+          <ac:cxnSpMkLst>
+            <pc:docMk/>
+            <pc:sldMk cId="123882738" sldId="257"/>
+            <ac:cxnSpMk id="98" creationId="{E683F014-C597-0053-DA33-FCC2CC2B63EC}"/>
+          </ac:cxnSpMkLst>
+        </pc:cxnChg>
+      </pc:sldChg>
+    </pc:docChg>
+  </pc:docChgLst>
+  <pc:docChgLst>
     <pc:chgData name="La, Trung Kien" userId="S::uas0015624@stud.fra-uas.de::a9b9c998-5aab-4e89-af6d-d527f5f74042" providerId="AD" clId="Web-{91896C77-A238-BDD0-3080-9753DCF1E304}"/>
     <pc:docChg chg="modSld">
       <pc:chgData name="La, Trung Kien" userId="S::uas0015624@stud.fra-uas.de::a9b9c998-5aab-4e89-af6d-d527f5f74042" providerId="AD" clId="Web-{91896C77-A238-BDD0-3080-9753DCF1E304}" dt="2025-08-23T10:46:08.723" v="93" actId="1076"/>
@@ -958,142 +1094,6 @@
             <pc:docMk/>
             <pc:sldMk cId="123882738" sldId="257"/>
             <ac:cxnSpMk id="59" creationId="{E7E6883C-DB3C-E1BF-D382-C44673D5E39C}"/>
-          </ac:cxnSpMkLst>
-        </pc:cxnChg>
-      </pc:sldChg>
-    </pc:docChg>
-  </pc:docChgLst>
-  <pc:docChgLst>
-    <pc:chgData name="La, Trung Kien" userId="S::uas0015624@stud.fra-uas.de::a9b9c998-5aab-4e89-af6d-d527f5f74042" providerId="AD" clId="Web-{F33CC7AB-E154-C95B-89F4-AFE146238E40}"/>
-    <pc:docChg chg="modSld">
-      <pc:chgData name="La, Trung Kien" userId="S::uas0015624@stud.fra-uas.de::a9b9c998-5aab-4e89-af6d-d527f5f74042" providerId="AD" clId="Web-{F33CC7AB-E154-C95B-89F4-AFE146238E40}" dt="2025-08-20T15:56:28.065" v="65" actId="20577"/>
-      <pc:docMkLst>
-        <pc:docMk/>
-      </pc:docMkLst>
-      <pc:sldChg chg="addSp modSp">
-        <pc:chgData name="La, Trung Kien" userId="S::uas0015624@stud.fra-uas.de::a9b9c998-5aab-4e89-af6d-d527f5f74042" providerId="AD" clId="Web-{F33CC7AB-E154-C95B-89F4-AFE146238E40}" dt="2025-08-20T15:56:28.065" v="65" actId="20577"/>
-        <pc:sldMkLst>
-          <pc:docMk/>
-          <pc:sldMk cId="123882738" sldId="257"/>
-        </pc:sldMkLst>
-        <pc:spChg chg="add mod">
-          <ac:chgData name="La, Trung Kien" userId="S::uas0015624@stud.fra-uas.de::a9b9c998-5aab-4e89-af6d-d527f5f74042" providerId="AD" clId="Web-{F33CC7AB-E154-C95B-89F4-AFE146238E40}" dt="2025-08-20T14:50:41.752" v="55" actId="20577"/>
-          <ac:spMkLst>
-            <pc:docMk/>
-            <pc:sldMk cId="123882738" sldId="257"/>
-            <ac:spMk id="3" creationId="{6267AA7F-6DFF-8827-73FC-9A7665A60043}"/>
-          </ac:spMkLst>
-        </pc:spChg>
-        <pc:spChg chg="mod">
-          <ac:chgData name="La, Trung Kien" userId="S::uas0015624@stud.fra-uas.de::a9b9c998-5aab-4e89-af6d-d527f5f74042" providerId="AD" clId="Web-{F33CC7AB-E154-C95B-89F4-AFE146238E40}" dt="2025-08-20T14:50:09.984" v="44" actId="1076"/>
-          <ac:spMkLst>
-            <pc:docMk/>
-            <pc:sldMk cId="123882738" sldId="257"/>
-            <ac:spMk id="85" creationId="{B2863921-4AD7-2187-5169-B52887C5BB7C}"/>
-          </ac:spMkLst>
-        </pc:spChg>
-        <pc:spChg chg="mod">
-          <ac:chgData name="La, Trung Kien" userId="S::uas0015624@stud.fra-uas.de::a9b9c998-5aab-4e89-af6d-d527f5f74042" providerId="AD" clId="Web-{F33CC7AB-E154-C95B-89F4-AFE146238E40}" dt="2025-08-20T14:49:57.483" v="43" actId="20577"/>
-          <ac:spMkLst>
-            <pc:docMk/>
-            <pc:sldMk cId="123882738" sldId="257"/>
-            <ac:spMk id="86" creationId="{C2D1C9D3-15D1-E5B4-37C9-DC88D0B7A2ED}"/>
-          </ac:spMkLst>
-        </pc:spChg>
-        <pc:spChg chg="mod">
-          <ac:chgData name="La, Trung Kien" userId="S::uas0015624@stud.fra-uas.de::a9b9c998-5aab-4e89-af6d-d527f5f74042" providerId="AD" clId="Web-{F33CC7AB-E154-C95B-89F4-AFE146238E40}" dt="2025-08-20T13:17:37.841" v="9" actId="20577"/>
-          <ac:spMkLst>
-            <pc:docMk/>
-            <pc:sldMk cId="123882738" sldId="257"/>
-            <ac:spMk id="90" creationId="{43E92C48-8564-31B5-0335-EBECF33D63F6}"/>
-          </ac:spMkLst>
-        </pc:spChg>
-        <pc:spChg chg="mod">
-          <ac:chgData name="La, Trung Kien" userId="S::uas0015624@stud.fra-uas.de::a9b9c998-5aab-4e89-af6d-d527f5f74042" providerId="AD" clId="Web-{F33CC7AB-E154-C95B-89F4-AFE146238E40}" dt="2025-08-20T15:56:28.065" v="65" actId="20577"/>
-          <ac:spMkLst>
-            <pc:docMk/>
-            <pc:sldMk cId="123882738" sldId="257"/>
-            <ac:spMk id="103" creationId="{BB884518-C736-E829-4178-CF9FF26239F7}"/>
-          </ac:spMkLst>
-        </pc:spChg>
-        <pc:picChg chg="add mod">
-          <ac:chgData name="La, Trung Kien" userId="S::uas0015624@stud.fra-uas.de::a9b9c998-5aab-4e89-af6d-d527f5f74042" providerId="AD" clId="Web-{F33CC7AB-E154-C95B-89F4-AFE146238E40}" dt="2025-08-20T14:50:51.174" v="57" actId="1076"/>
-          <ac:picMkLst>
-            <pc:docMk/>
-            <pc:sldMk cId="123882738" sldId="257"/>
-            <ac:picMk id="2" creationId="{A9CBCC19-C54E-5060-9D10-DC56A7CD1714}"/>
-          </ac:picMkLst>
-        </pc:picChg>
-        <pc:picChg chg="mod">
-          <ac:chgData name="La, Trung Kien" userId="S::uas0015624@stud.fra-uas.de::a9b9c998-5aab-4e89-af6d-d527f5f74042" providerId="AD" clId="Web-{F33CC7AB-E154-C95B-89F4-AFE146238E40}" dt="2025-08-20T13:18:01.685" v="12" actId="1076"/>
-          <ac:picMkLst>
-            <pc:docMk/>
-            <pc:sldMk cId="123882738" sldId="257"/>
-            <ac:picMk id="72" creationId="{4072CEA9-0692-6817-5B1C-180EF110638E}"/>
-          </ac:picMkLst>
-        </pc:picChg>
-        <pc:picChg chg="mod">
-          <ac:chgData name="La, Trung Kien" userId="S::uas0015624@stud.fra-uas.de::a9b9c998-5aab-4e89-af6d-d527f5f74042" providerId="AD" clId="Web-{F33CC7AB-E154-C95B-89F4-AFE146238E40}" dt="2025-08-20T13:17:58.904" v="11" actId="1076"/>
-          <ac:picMkLst>
-            <pc:docMk/>
-            <pc:sldMk cId="123882738" sldId="257"/>
-            <ac:picMk id="74" creationId="{7DA6E27B-8B08-43AB-ECC8-8B9CA312E519}"/>
-          </ac:picMkLst>
-        </pc:picChg>
-        <pc:picChg chg="mod">
-          <ac:chgData name="La, Trung Kien" userId="S::uas0015624@stud.fra-uas.de::a9b9c998-5aab-4e89-af6d-d527f5f74042" providerId="AD" clId="Web-{F33CC7AB-E154-C95B-89F4-AFE146238E40}" dt="2025-08-20T13:18:05.013" v="14" actId="1076"/>
-          <ac:picMkLst>
-            <pc:docMk/>
-            <pc:sldMk cId="123882738" sldId="257"/>
-            <ac:picMk id="75" creationId="{2FA3A73D-8264-7740-3D88-D73E3F3AF308}"/>
-          </ac:picMkLst>
-        </pc:picChg>
-        <pc:picChg chg="mod">
-          <ac:chgData name="La, Trung Kien" userId="S::uas0015624@stud.fra-uas.de::a9b9c998-5aab-4e89-af6d-d527f5f74042" providerId="AD" clId="Web-{F33CC7AB-E154-C95B-89F4-AFE146238E40}" dt="2025-08-20T13:17:49.216" v="10" actId="1076"/>
-          <ac:picMkLst>
-            <pc:docMk/>
-            <pc:sldMk cId="123882738" sldId="257"/>
-            <ac:picMk id="77" creationId="{F4F72DDA-D17F-93CD-7AEA-FD6255737A90}"/>
-          </ac:picMkLst>
-        </pc:picChg>
-        <pc:cxnChg chg="mod">
-          <ac:chgData name="La, Trung Kien" userId="S::uas0015624@stud.fra-uas.de::a9b9c998-5aab-4e89-af6d-d527f5f74042" providerId="AD" clId="Web-{F33CC7AB-E154-C95B-89F4-AFE146238E40}" dt="2025-08-20T13:19:44.736" v="25" actId="14100"/>
-          <ac:cxnSpMkLst>
-            <pc:docMk/>
-            <pc:sldMk cId="123882738" sldId="257"/>
-            <ac:cxnSpMk id="58" creationId="{05EC3169-D325-6AC8-75B7-FA0F9B673D7F}"/>
-          </ac:cxnSpMkLst>
-        </pc:cxnChg>
-        <pc:cxnChg chg="mod">
-          <ac:chgData name="La, Trung Kien" userId="S::uas0015624@stud.fra-uas.de::a9b9c998-5aab-4e89-af6d-d527f5f74042" providerId="AD" clId="Web-{F33CC7AB-E154-C95B-89F4-AFE146238E40}" dt="2025-08-20T13:20:03.580" v="27" actId="1076"/>
-          <ac:cxnSpMkLst>
-            <pc:docMk/>
-            <pc:sldMk cId="123882738" sldId="257"/>
-            <ac:cxnSpMk id="60" creationId="{D50A15D9-7EB0-44F8-37FC-9DC604F58CBB}"/>
-          </ac:cxnSpMkLst>
-        </pc:cxnChg>
-        <pc:cxnChg chg="mod">
-          <ac:chgData name="La, Trung Kien" userId="S::uas0015624@stud.fra-uas.de::a9b9c998-5aab-4e89-af6d-d527f5f74042" providerId="AD" clId="Web-{F33CC7AB-E154-C95B-89F4-AFE146238E40}" dt="2025-08-20T15:56:27.706" v="64" actId="14100"/>
-          <ac:cxnSpMkLst>
-            <pc:docMk/>
-            <pc:sldMk cId="123882738" sldId="257"/>
-            <ac:cxnSpMk id="79" creationId="{EE5955F2-0C89-7E1E-306E-3B5F71CAFC20}"/>
-          </ac:cxnSpMkLst>
-        </pc:cxnChg>
-        <pc:cxnChg chg="mod">
-          <ac:chgData name="La, Trung Kien" userId="S::uas0015624@stud.fra-uas.de::a9b9c998-5aab-4e89-af6d-d527f5f74042" providerId="AD" clId="Web-{F33CC7AB-E154-C95B-89F4-AFE146238E40}" dt="2025-08-20T15:27:35.972" v="60" actId="1076"/>
-          <ac:cxnSpMkLst>
-            <pc:docMk/>
-            <pc:sldMk cId="123882738" sldId="257"/>
-            <ac:cxnSpMk id="96" creationId="{7ECD9DED-8324-55AC-554D-1298D880B0C4}"/>
-          </ac:cxnSpMkLst>
-        </pc:cxnChg>
-        <pc:cxnChg chg="mod">
-          <ac:chgData name="La, Trung Kien" userId="S::uas0015624@stud.fra-uas.de::a9b9c998-5aab-4e89-af6d-d527f5f74042" providerId="AD" clId="Web-{F33CC7AB-E154-C95B-89F4-AFE146238E40}" dt="2025-08-20T15:27:58.787" v="61" actId="1076"/>
-          <ac:cxnSpMkLst>
-            <pc:docMk/>
-            <pc:sldMk cId="123882738" sldId="257"/>
-            <ac:cxnSpMk id="98" creationId="{E683F014-C597-0053-DA33-FCC2CC2B63EC}"/>
           </ac:cxnSpMkLst>
         </pc:cxnChg>
       </pc:sldChg>
@@ -1231,7 +1231,7 @@
           <a:p>
             <a:fld id="{846CE7D5-CF57-46EF-B807-FDD0502418D4}" type="datetimeFigureOut">
               <a:rPr lang="en-US" smtClean="0"/>
-              <a:t>1/4/2026</a:t>
+              <a:t>1/10/2026</a:t>
             </a:fld>
             <a:endParaRPr lang="en-US"/>
           </a:p>
@@ -1399,7 +1399,7 @@
           <a:p>
             <a:fld id="{846CE7D5-CF57-46EF-B807-FDD0502418D4}" type="datetimeFigureOut">
               <a:rPr lang="en-US" smtClean="0"/>
-              <a:t>1/4/2026</a:t>
+              <a:t>1/10/2026</a:t>
             </a:fld>
             <a:endParaRPr lang="en-US"/>
           </a:p>
@@ -1577,7 +1577,7 @@
           <a:p>
             <a:fld id="{846CE7D5-CF57-46EF-B807-FDD0502418D4}" type="datetimeFigureOut">
               <a:rPr lang="en-US" smtClean="0"/>
-              <a:t>1/4/2026</a:t>
+              <a:t>1/10/2026</a:t>
             </a:fld>
             <a:endParaRPr lang="en-US"/>
           </a:p>
@@ -1745,7 +1745,7 @@
           <a:p>
             <a:fld id="{846CE7D5-CF57-46EF-B807-FDD0502418D4}" type="datetimeFigureOut">
               <a:rPr lang="en-US" smtClean="0"/>
-              <a:t>1/4/2026</a:t>
+              <a:t>1/10/2026</a:t>
             </a:fld>
             <a:endParaRPr lang="en-US"/>
           </a:p>
@@ -1990,7 +1990,7 @@
           <a:p>
             <a:fld id="{846CE7D5-CF57-46EF-B807-FDD0502418D4}" type="datetimeFigureOut">
               <a:rPr lang="en-US" smtClean="0"/>
-              <a:t>1/4/2026</a:t>
+              <a:t>1/10/2026</a:t>
             </a:fld>
             <a:endParaRPr lang="en-US"/>
           </a:p>
@@ -2219,7 +2219,7 @@
           <a:p>
             <a:fld id="{846CE7D5-CF57-46EF-B807-FDD0502418D4}" type="datetimeFigureOut">
               <a:rPr lang="en-US" smtClean="0"/>
-              <a:t>1/4/2026</a:t>
+              <a:t>1/10/2026</a:t>
             </a:fld>
             <a:endParaRPr lang="en-US"/>
           </a:p>
@@ -2583,7 +2583,7 @@
           <a:p>
             <a:fld id="{846CE7D5-CF57-46EF-B807-FDD0502418D4}" type="datetimeFigureOut">
               <a:rPr lang="en-US" smtClean="0"/>
-              <a:t>1/4/2026</a:t>
+              <a:t>1/10/2026</a:t>
             </a:fld>
             <a:endParaRPr lang="en-US"/>
           </a:p>
@@ -2700,7 +2700,7 @@
           <a:p>
             <a:fld id="{846CE7D5-CF57-46EF-B807-FDD0502418D4}" type="datetimeFigureOut">
               <a:rPr lang="en-US" smtClean="0"/>
-              <a:t>1/4/2026</a:t>
+              <a:t>1/10/2026</a:t>
             </a:fld>
             <a:endParaRPr lang="en-US"/>
           </a:p>
@@ -2795,7 +2795,7 @@
           <a:p>
             <a:fld id="{846CE7D5-CF57-46EF-B807-FDD0502418D4}" type="datetimeFigureOut">
               <a:rPr lang="en-US" smtClean="0"/>
-              <a:t>1/4/2026</a:t>
+              <a:t>1/10/2026</a:t>
             </a:fld>
             <a:endParaRPr lang="en-US"/>
           </a:p>
@@ -3070,7 +3070,7 @@
           <a:p>
             <a:fld id="{846CE7D5-CF57-46EF-B807-FDD0502418D4}" type="datetimeFigureOut">
               <a:rPr lang="en-US" smtClean="0"/>
-              <a:t>1/4/2026</a:t>
+              <a:t>1/10/2026</a:t>
             </a:fld>
             <a:endParaRPr lang="en-US"/>
           </a:p>
@@ -3325,7 +3325,7 @@
           <a:p>
             <a:fld id="{846CE7D5-CF57-46EF-B807-FDD0502418D4}" type="datetimeFigureOut">
               <a:rPr lang="en-US" smtClean="0"/>
-              <a:t>1/4/2026</a:t>
+              <a:t>1/10/2026</a:t>
             </a:fld>
             <a:endParaRPr lang="en-US"/>
           </a:p>
@@ -3536,7 +3536,7 @@
           <a:p>
             <a:fld id="{846CE7D5-CF57-46EF-B807-FDD0502418D4}" type="datetimeFigureOut">
               <a:rPr lang="en-US" smtClean="0"/>
-              <a:t>1/4/2026</a:t>
+              <a:t>1/10/2026</a:t>
             </a:fld>
             <a:endParaRPr lang="en-US"/>
           </a:p>
@@ -4396,7 +4396,7 @@
         <p:spPr>
           <a:xfrm>
             <a:off x="-49205" y="1662044"/>
-            <a:ext cx="1350955" cy="2492990"/>
+            <a:ext cx="1471600" cy="2492990"/>
           </a:xfrm>
           <a:prstGeom prst="rect">
             <a:avLst/>
@@ -4472,7 +4472,7 @@
                   <a:schemeClr val="accent6"/>
                 </a:solidFill>
               </a:rPr>
-              <a:t>“What is your current motor temperature”</a:t>
+              <a:t>“What is your current motor temperature?”</a:t>
             </a:r>
           </a:p>
           <a:p>
@@ -5621,42 +5621,6 @@
       </p:pic>
       <p:pic>
         <p:nvPicPr>
-          <p:cNvPr id="25" name="Grafik 24" descr="Pfeil: Kurve im Uhrzeigersinn mit einfarbiger Füllung">
-            <a:extLst>
-              <a:ext uri="{FF2B5EF4-FFF2-40B4-BE49-F238E27FC236}">
-                <a16:creationId xmlns:a16="http://schemas.microsoft.com/office/drawing/2014/main" id="{ADC1DA14-EA72-E8CE-33AF-D4D58D64373D}"/>
-              </a:ext>
-            </a:extLst>
-          </p:cNvPr>
-          <p:cNvPicPr>
-            <a:picLocks noChangeAspect="1"/>
-          </p:cNvPicPr>
-          <p:nvPr/>
-        </p:nvPicPr>
-        <p:blipFill>
-          <a:blip r:embed="rId12">
-            <a:extLst>
-              <a:ext uri="{96DAC541-7B7A-43D3-8B79-37D633B846F1}">
-                <asvg:svgBlip xmlns:asvg="http://schemas.microsoft.com/office/drawing/2016/SVG/main" r:embed="rId13"/>
-              </a:ext>
-            </a:extLst>
-          </a:blip>
-          <a:stretch>
-            <a:fillRect/>
-          </a:stretch>
-        </p:blipFill>
-        <p:spPr>
-          <a:xfrm rot="10800000">
-            <a:off x="1229960" y="1508219"/>
-            <a:ext cx="914400" cy="2502454"/>
-          </a:xfrm>
-          <a:prstGeom prst="rect">
-            <a:avLst/>
-          </a:prstGeom>
-        </p:spPr>
-      </p:pic>
-      <p:pic>
-        <p:nvPicPr>
           <p:cNvPr id="37" name="Grafik 36" descr="Ein Bild, das Küchenutensilien, Design, Schwarzweiß enthält.&#10;&#10;KI-generierte Inhalte können fehlerhaft sein.">
             <a:extLst>
               <a:ext uri="{FF2B5EF4-FFF2-40B4-BE49-F238E27FC236}">
@@ -5670,7 +5634,7 @@
           <p:nvPr/>
         </p:nvPicPr>
         <p:blipFill>
-          <a:blip r:embed="rId14"/>
+          <a:blip r:embed="rId12"/>
           <a:stretch>
             <a:fillRect/>
           </a:stretch>
@@ -5685,6 +5649,49 @@
           </a:prstGeom>
         </p:spPr>
       </p:pic>
+      <p:cxnSp>
+        <p:nvCxnSpPr>
+          <p:cNvPr id="45" name="Verbinder: gewinkelt 44">
+            <a:extLst>
+              <a:ext uri="{FF2B5EF4-FFF2-40B4-BE49-F238E27FC236}">
+                <a16:creationId xmlns:a16="http://schemas.microsoft.com/office/drawing/2014/main" id="{178AB4EF-ED65-7180-CD2C-54647BAECBFB}"/>
+              </a:ext>
+            </a:extLst>
+          </p:cNvPr>
+          <p:cNvCxnSpPr>
+            <a:cxnSpLocks/>
+          </p:cNvCxnSpPr>
+          <p:nvPr/>
+        </p:nvCxnSpPr>
+        <p:spPr>
+          <a:xfrm rot="16200000" flipH="1">
+            <a:off x="625493" y="2576583"/>
+            <a:ext cx="2253886" cy="251047"/>
+          </a:xfrm>
+          <a:prstGeom prst="bentConnector3">
+            <a:avLst>
+              <a:gd name="adj1" fmla="val 269"/>
+            </a:avLst>
+          </a:prstGeom>
+          <a:ln>
+            <a:tailEnd type="triangle"/>
+          </a:ln>
+        </p:spPr>
+        <p:style>
+          <a:lnRef idx="2">
+            <a:schemeClr val="accent1"/>
+          </a:lnRef>
+          <a:fillRef idx="0">
+            <a:schemeClr val="accent1"/>
+          </a:fillRef>
+          <a:effectRef idx="1">
+            <a:schemeClr val="accent1"/>
+          </a:effectRef>
+          <a:fontRef idx="minor">
+            <a:schemeClr val="tx1"/>
+          </a:fontRef>
+        </p:style>
+      </p:cxnSp>
     </p:spTree>
     <p:extLst>
       <p:ext uri="{BB962C8B-B14F-4D97-AF65-F5344CB8AC3E}">

</xml_diff>

<commit_message>
added fixes, image improvement, results (WIP)
</commit_message>
<xml_diff>
--- a/images/framework_architecture.pptx
+++ b/images/framework_architecture.pptx
@@ -876,6 +876,94 @@
     </pc:docChg>
   </pc:docChgLst>
   <pc:docChgLst>
+    <pc:chgData name="La, Trung Kien" userId="S::uas0015624@stud.fra-uas.de::a9b9c998-5aab-4e89-af6d-d527f5f74042" providerId="AD" clId="Web-{91896C77-A238-BDD0-3080-9753DCF1E304}"/>
+    <pc:docChg chg="modSld">
+      <pc:chgData name="La, Trung Kien" userId="S::uas0015624@stud.fra-uas.de::a9b9c998-5aab-4e89-af6d-d527f5f74042" providerId="AD" clId="Web-{91896C77-A238-BDD0-3080-9753DCF1E304}" dt="2025-08-23T10:46:08.723" v="93" actId="1076"/>
+      <pc:docMkLst>
+        <pc:docMk/>
+      </pc:docMkLst>
+      <pc:sldChg chg="addSp delSp modSp">
+        <pc:chgData name="La, Trung Kien" userId="S::uas0015624@stud.fra-uas.de::a9b9c998-5aab-4e89-af6d-d527f5f74042" providerId="AD" clId="Web-{91896C77-A238-BDD0-3080-9753DCF1E304}" dt="2025-08-23T10:46:08.723" v="93" actId="1076"/>
+        <pc:sldMkLst>
+          <pc:docMk/>
+          <pc:sldMk cId="123882738" sldId="257"/>
+        </pc:sldMkLst>
+        <pc:spChg chg="add mod">
+          <ac:chgData name="La, Trung Kien" userId="S::uas0015624@stud.fra-uas.de::a9b9c998-5aab-4e89-af6d-d527f5f74042" providerId="AD" clId="Web-{91896C77-A238-BDD0-3080-9753DCF1E304}" dt="2025-08-23T10:44:20.664" v="89" actId="1076"/>
+          <ac:spMkLst>
+            <pc:docMk/>
+            <pc:sldMk cId="123882738" sldId="257"/>
+            <ac:spMk id="12" creationId="{7CD8BBE4-3030-9C59-DB6D-927D7DF6C540}"/>
+          </ac:spMkLst>
+        </pc:spChg>
+        <pc:spChg chg="add mod">
+          <ac:chgData name="La, Trung Kien" userId="S::uas0015624@stud.fra-uas.de::a9b9c998-5aab-4e89-af6d-d527f5f74042" providerId="AD" clId="Web-{91896C77-A238-BDD0-3080-9753DCF1E304}" dt="2025-08-23T10:36:38.067" v="57" actId="20577"/>
+          <ac:spMkLst>
+            <pc:docMk/>
+            <pc:sldMk cId="123882738" sldId="257"/>
+            <ac:spMk id="13" creationId="{EE2E90EC-D814-7761-E80D-FFD9095DBDA8}"/>
+          </ac:spMkLst>
+        </pc:spChg>
+        <pc:spChg chg="mod">
+          <ac:chgData name="La, Trung Kien" userId="S::uas0015624@stud.fra-uas.de::a9b9c998-5aab-4e89-af6d-d527f5f74042" providerId="AD" clId="Web-{91896C77-A238-BDD0-3080-9753DCF1E304}" dt="2025-08-23T10:46:08.723" v="93" actId="1076"/>
+          <ac:spMkLst>
+            <pc:docMk/>
+            <pc:sldMk cId="123882738" sldId="257"/>
+            <ac:spMk id="89" creationId="{7CC47AA3-C404-D285-27D1-8CF8B1ECE79E}"/>
+          </ac:spMkLst>
+        </pc:spChg>
+        <pc:picChg chg="add mod">
+          <ac:chgData name="La, Trung Kien" userId="S::uas0015624@stud.fra-uas.de::a9b9c998-5aab-4e89-af6d-d527f5f74042" providerId="AD" clId="Web-{91896C77-A238-BDD0-3080-9753DCF1E304}" dt="2025-08-23T10:44:24.086" v="90" actId="1076"/>
+          <ac:picMkLst>
+            <pc:docMk/>
+            <pc:sldMk cId="123882738" sldId="257"/>
+            <ac:picMk id="6" creationId="{09FB18A4-6616-59DC-4E4C-5FA4FC7572D2}"/>
+          </ac:picMkLst>
+        </pc:picChg>
+        <pc:picChg chg="add mod">
+          <ac:chgData name="La, Trung Kien" userId="S::uas0015624@stud.fra-uas.de::a9b9c998-5aab-4e89-af6d-d527f5f74042" providerId="AD" clId="Web-{91896C77-A238-BDD0-3080-9753DCF1E304}" dt="2025-08-23T10:43:19.678" v="84" actId="1076"/>
+          <ac:picMkLst>
+            <pc:docMk/>
+            <pc:sldMk cId="123882738" sldId="257"/>
+            <ac:picMk id="8" creationId="{A7FC7613-B39A-D4E2-D008-D9B2BA9F1180}"/>
+          </ac:picMkLst>
+        </pc:picChg>
+        <pc:picChg chg="mod">
+          <ac:chgData name="La, Trung Kien" userId="S::uas0015624@stud.fra-uas.de::a9b9c998-5aab-4e89-af6d-d527f5f74042" providerId="AD" clId="Web-{91896C77-A238-BDD0-3080-9753DCF1E304}" dt="2025-08-23T10:46:04.551" v="92" actId="1076"/>
+          <ac:picMkLst>
+            <pc:docMk/>
+            <pc:sldMk cId="123882738" sldId="257"/>
+            <ac:picMk id="14" creationId="{79F503FB-4A52-1A9F-6CC9-C79CBBD9BF32}"/>
+          </ac:picMkLst>
+        </pc:picChg>
+        <pc:cxnChg chg="add mod">
+          <ac:chgData name="La, Trung Kien" userId="S::uas0015624@stud.fra-uas.de::a9b9c998-5aab-4e89-af6d-d527f5f74042" providerId="AD" clId="Web-{91896C77-A238-BDD0-3080-9753DCF1E304}" dt="2025-08-23T10:43:15.302" v="83" actId="1076"/>
+          <ac:cxnSpMkLst>
+            <pc:docMk/>
+            <pc:sldMk cId="123882738" sldId="257"/>
+            <ac:cxnSpMk id="15" creationId="{441606DD-962A-FD99-4A85-3A9F5D2C9272}"/>
+          </ac:cxnSpMkLst>
+        </pc:cxnChg>
+        <pc:cxnChg chg="add mod">
+          <ac:chgData name="La, Trung Kien" userId="S::uas0015624@stud.fra-uas.de::a9b9c998-5aab-4e89-af6d-d527f5f74042" providerId="AD" clId="Web-{91896C77-A238-BDD0-3080-9753DCF1E304}" dt="2025-08-23T10:44:52.478" v="91"/>
+          <ac:cxnSpMkLst>
+            <pc:docMk/>
+            <pc:sldMk cId="123882738" sldId="257"/>
+            <ac:cxnSpMk id="16" creationId="{8E5FDF2C-F02B-0725-BC14-310C5294E335}"/>
+          </ac:cxnSpMkLst>
+        </pc:cxnChg>
+        <pc:cxnChg chg="mod">
+          <ac:chgData name="La, Trung Kien" userId="S::uas0015624@stud.fra-uas.de::a9b9c998-5aab-4e89-af6d-d527f5f74042" providerId="AD" clId="Web-{91896C77-A238-BDD0-3080-9753DCF1E304}" dt="2025-08-23T10:42:37.926" v="81" actId="14100"/>
+          <ac:cxnSpMkLst>
+            <pc:docMk/>
+            <pc:sldMk cId="123882738" sldId="257"/>
+            <ac:cxnSpMk id="59" creationId="{E7E6883C-DB3C-E1BF-D382-C44673D5E39C}"/>
+          </ac:cxnSpMkLst>
+        </pc:cxnChg>
+      </pc:sldChg>
+    </pc:docChg>
+  </pc:docChgLst>
+  <pc:docChgLst>
     <pc:chgData name="La, Trung Kien" userId="S::uas0015624@stud.fra-uas.de::a9b9c998-5aab-4e89-af6d-d527f5f74042" providerId="AD" clId="Web-{F33CC7AB-E154-C95B-89F4-AFE146238E40}"/>
     <pc:docChg chg="modSld">
       <pc:chgData name="La, Trung Kien" userId="S::uas0015624@stud.fra-uas.de::a9b9c998-5aab-4e89-af6d-d527f5f74042" providerId="AD" clId="Web-{F33CC7AB-E154-C95B-89F4-AFE146238E40}" dt="2025-08-20T15:56:28.065" v="65" actId="20577"/>
@@ -1006,94 +1094,6 @@
             <pc:docMk/>
             <pc:sldMk cId="123882738" sldId="257"/>
             <ac:cxnSpMk id="98" creationId="{E683F014-C597-0053-DA33-FCC2CC2B63EC}"/>
-          </ac:cxnSpMkLst>
-        </pc:cxnChg>
-      </pc:sldChg>
-    </pc:docChg>
-  </pc:docChgLst>
-  <pc:docChgLst>
-    <pc:chgData name="La, Trung Kien" userId="S::uas0015624@stud.fra-uas.de::a9b9c998-5aab-4e89-af6d-d527f5f74042" providerId="AD" clId="Web-{91896C77-A238-BDD0-3080-9753DCF1E304}"/>
-    <pc:docChg chg="modSld">
-      <pc:chgData name="La, Trung Kien" userId="S::uas0015624@stud.fra-uas.de::a9b9c998-5aab-4e89-af6d-d527f5f74042" providerId="AD" clId="Web-{91896C77-A238-BDD0-3080-9753DCF1E304}" dt="2025-08-23T10:46:08.723" v="93" actId="1076"/>
-      <pc:docMkLst>
-        <pc:docMk/>
-      </pc:docMkLst>
-      <pc:sldChg chg="addSp delSp modSp">
-        <pc:chgData name="La, Trung Kien" userId="S::uas0015624@stud.fra-uas.de::a9b9c998-5aab-4e89-af6d-d527f5f74042" providerId="AD" clId="Web-{91896C77-A238-BDD0-3080-9753DCF1E304}" dt="2025-08-23T10:46:08.723" v="93" actId="1076"/>
-        <pc:sldMkLst>
-          <pc:docMk/>
-          <pc:sldMk cId="123882738" sldId="257"/>
-        </pc:sldMkLst>
-        <pc:spChg chg="add mod">
-          <ac:chgData name="La, Trung Kien" userId="S::uas0015624@stud.fra-uas.de::a9b9c998-5aab-4e89-af6d-d527f5f74042" providerId="AD" clId="Web-{91896C77-A238-BDD0-3080-9753DCF1E304}" dt="2025-08-23T10:44:20.664" v="89" actId="1076"/>
-          <ac:spMkLst>
-            <pc:docMk/>
-            <pc:sldMk cId="123882738" sldId="257"/>
-            <ac:spMk id="12" creationId="{7CD8BBE4-3030-9C59-DB6D-927D7DF6C540}"/>
-          </ac:spMkLst>
-        </pc:spChg>
-        <pc:spChg chg="add mod">
-          <ac:chgData name="La, Trung Kien" userId="S::uas0015624@stud.fra-uas.de::a9b9c998-5aab-4e89-af6d-d527f5f74042" providerId="AD" clId="Web-{91896C77-A238-BDD0-3080-9753DCF1E304}" dt="2025-08-23T10:36:38.067" v="57" actId="20577"/>
-          <ac:spMkLst>
-            <pc:docMk/>
-            <pc:sldMk cId="123882738" sldId="257"/>
-            <ac:spMk id="13" creationId="{EE2E90EC-D814-7761-E80D-FFD9095DBDA8}"/>
-          </ac:spMkLst>
-        </pc:spChg>
-        <pc:spChg chg="mod">
-          <ac:chgData name="La, Trung Kien" userId="S::uas0015624@stud.fra-uas.de::a9b9c998-5aab-4e89-af6d-d527f5f74042" providerId="AD" clId="Web-{91896C77-A238-BDD0-3080-9753DCF1E304}" dt="2025-08-23T10:46:08.723" v="93" actId="1076"/>
-          <ac:spMkLst>
-            <pc:docMk/>
-            <pc:sldMk cId="123882738" sldId="257"/>
-            <ac:spMk id="89" creationId="{7CC47AA3-C404-D285-27D1-8CF8B1ECE79E}"/>
-          </ac:spMkLst>
-        </pc:spChg>
-        <pc:picChg chg="add mod">
-          <ac:chgData name="La, Trung Kien" userId="S::uas0015624@stud.fra-uas.de::a9b9c998-5aab-4e89-af6d-d527f5f74042" providerId="AD" clId="Web-{91896C77-A238-BDD0-3080-9753DCF1E304}" dt="2025-08-23T10:44:24.086" v="90" actId="1076"/>
-          <ac:picMkLst>
-            <pc:docMk/>
-            <pc:sldMk cId="123882738" sldId="257"/>
-            <ac:picMk id="6" creationId="{09FB18A4-6616-59DC-4E4C-5FA4FC7572D2}"/>
-          </ac:picMkLst>
-        </pc:picChg>
-        <pc:picChg chg="add mod">
-          <ac:chgData name="La, Trung Kien" userId="S::uas0015624@stud.fra-uas.de::a9b9c998-5aab-4e89-af6d-d527f5f74042" providerId="AD" clId="Web-{91896C77-A238-BDD0-3080-9753DCF1E304}" dt="2025-08-23T10:43:19.678" v="84" actId="1076"/>
-          <ac:picMkLst>
-            <pc:docMk/>
-            <pc:sldMk cId="123882738" sldId="257"/>
-            <ac:picMk id="8" creationId="{A7FC7613-B39A-D4E2-D008-D9B2BA9F1180}"/>
-          </ac:picMkLst>
-        </pc:picChg>
-        <pc:picChg chg="mod">
-          <ac:chgData name="La, Trung Kien" userId="S::uas0015624@stud.fra-uas.de::a9b9c998-5aab-4e89-af6d-d527f5f74042" providerId="AD" clId="Web-{91896C77-A238-BDD0-3080-9753DCF1E304}" dt="2025-08-23T10:46:04.551" v="92" actId="1076"/>
-          <ac:picMkLst>
-            <pc:docMk/>
-            <pc:sldMk cId="123882738" sldId="257"/>
-            <ac:picMk id="14" creationId="{79F503FB-4A52-1A9F-6CC9-C79CBBD9BF32}"/>
-          </ac:picMkLst>
-        </pc:picChg>
-        <pc:cxnChg chg="add mod">
-          <ac:chgData name="La, Trung Kien" userId="S::uas0015624@stud.fra-uas.de::a9b9c998-5aab-4e89-af6d-d527f5f74042" providerId="AD" clId="Web-{91896C77-A238-BDD0-3080-9753DCF1E304}" dt="2025-08-23T10:43:15.302" v="83" actId="1076"/>
-          <ac:cxnSpMkLst>
-            <pc:docMk/>
-            <pc:sldMk cId="123882738" sldId="257"/>
-            <ac:cxnSpMk id="15" creationId="{441606DD-962A-FD99-4A85-3A9F5D2C9272}"/>
-          </ac:cxnSpMkLst>
-        </pc:cxnChg>
-        <pc:cxnChg chg="add mod">
-          <ac:chgData name="La, Trung Kien" userId="S::uas0015624@stud.fra-uas.de::a9b9c998-5aab-4e89-af6d-d527f5f74042" providerId="AD" clId="Web-{91896C77-A238-BDD0-3080-9753DCF1E304}" dt="2025-08-23T10:44:52.478" v="91"/>
-          <ac:cxnSpMkLst>
-            <pc:docMk/>
-            <pc:sldMk cId="123882738" sldId="257"/>
-            <ac:cxnSpMk id="16" creationId="{8E5FDF2C-F02B-0725-BC14-310C5294E335}"/>
-          </ac:cxnSpMkLst>
-        </pc:cxnChg>
-        <pc:cxnChg chg="mod">
-          <ac:chgData name="La, Trung Kien" userId="S::uas0015624@stud.fra-uas.de::a9b9c998-5aab-4e89-af6d-d527f5f74042" providerId="AD" clId="Web-{91896C77-A238-BDD0-3080-9753DCF1E304}" dt="2025-08-23T10:42:37.926" v="81" actId="14100"/>
-          <ac:cxnSpMkLst>
-            <pc:docMk/>
-            <pc:sldMk cId="123882738" sldId="257"/>
-            <ac:cxnSpMk id="59" creationId="{E7E6883C-DB3C-E1BF-D382-C44673D5E39C}"/>
           </ac:cxnSpMkLst>
         </pc:cxnChg>
       </pc:sldChg>
@@ -1231,7 +1231,7 @@
           <a:p>
             <a:fld id="{846CE7D5-CF57-46EF-B807-FDD0502418D4}" type="datetimeFigureOut">
               <a:rPr lang="en-US" smtClean="0"/>
-              <a:t>1/10/2026</a:t>
+              <a:t>1/12/2026</a:t>
             </a:fld>
             <a:endParaRPr lang="en-US"/>
           </a:p>
@@ -1399,7 +1399,7 @@
           <a:p>
             <a:fld id="{846CE7D5-CF57-46EF-B807-FDD0502418D4}" type="datetimeFigureOut">
               <a:rPr lang="en-US" smtClean="0"/>
-              <a:t>1/10/2026</a:t>
+              <a:t>1/12/2026</a:t>
             </a:fld>
             <a:endParaRPr lang="en-US"/>
           </a:p>
@@ -1577,7 +1577,7 @@
           <a:p>
             <a:fld id="{846CE7D5-CF57-46EF-B807-FDD0502418D4}" type="datetimeFigureOut">
               <a:rPr lang="en-US" smtClean="0"/>
-              <a:t>1/10/2026</a:t>
+              <a:t>1/12/2026</a:t>
             </a:fld>
             <a:endParaRPr lang="en-US"/>
           </a:p>
@@ -1745,7 +1745,7 @@
           <a:p>
             <a:fld id="{846CE7D5-CF57-46EF-B807-FDD0502418D4}" type="datetimeFigureOut">
               <a:rPr lang="en-US" smtClean="0"/>
-              <a:t>1/10/2026</a:t>
+              <a:t>1/12/2026</a:t>
             </a:fld>
             <a:endParaRPr lang="en-US"/>
           </a:p>
@@ -1990,7 +1990,7 @@
           <a:p>
             <a:fld id="{846CE7D5-CF57-46EF-B807-FDD0502418D4}" type="datetimeFigureOut">
               <a:rPr lang="en-US" smtClean="0"/>
-              <a:t>1/10/2026</a:t>
+              <a:t>1/12/2026</a:t>
             </a:fld>
             <a:endParaRPr lang="en-US"/>
           </a:p>
@@ -2219,7 +2219,7 @@
           <a:p>
             <a:fld id="{846CE7D5-CF57-46EF-B807-FDD0502418D4}" type="datetimeFigureOut">
               <a:rPr lang="en-US" smtClean="0"/>
-              <a:t>1/10/2026</a:t>
+              <a:t>1/12/2026</a:t>
             </a:fld>
             <a:endParaRPr lang="en-US"/>
           </a:p>
@@ -2583,7 +2583,7 @@
           <a:p>
             <a:fld id="{846CE7D5-CF57-46EF-B807-FDD0502418D4}" type="datetimeFigureOut">
               <a:rPr lang="en-US" smtClean="0"/>
-              <a:t>1/10/2026</a:t>
+              <a:t>1/12/2026</a:t>
             </a:fld>
             <a:endParaRPr lang="en-US"/>
           </a:p>
@@ -2700,7 +2700,7 @@
           <a:p>
             <a:fld id="{846CE7D5-CF57-46EF-B807-FDD0502418D4}" type="datetimeFigureOut">
               <a:rPr lang="en-US" smtClean="0"/>
-              <a:t>1/10/2026</a:t>
+              <a:t>1/12/2026</a:t>
             </a:fld>
             <a:endParaRPr lang="en-US"/>
           </a:p>
@@ -2795,7 +2795,7 @@
           <a:p>
             <a:fld id="{846CE7D5-CF57-46EF-B807-FDD0502418D4}" type="datetimeFigureOut">
               <a:rPr lang="en-US" smtClean="0"/>
-              <a:t>1/10/2026</a:t>
+              <a:t>1/12/2026</a:t>
             </a:fld>
             <a:endParaRPr lang="en-US"/>
           </a:p>
@@ -3070,7 +3070,7 @@
           <a:p>
             <a:fld id="{846CE7D5-CF57-46EF-B807-FDD0502418D4}" type="datetimeFigureOut">
               <a:rPr lang="en-US" smtClean="0"/>
-              <a:t>1/10/2026</a:t>
+              <a:t>1/12/2026</a:t>
             </a:fld>
             <a:endParaRPr lang="en-US"/>
           </a:p>
@@ -3325,7 +3325,7 @@
           <a:p>
             <a:fld id="{846CE7D5-CF57-46EF-B807-FDD0502418D4}" type="datetimeFigureOut">
               <a:rPr lang="en-US" smtClean="0"/>
-              <a:t>1/10/2026</a:t>
+              <a:t>1/12/2026</a:t>
             </a:fld>
             <a:endParaRPr lang="en-US"/>
           </a:p>
@@ -3536,7 +3536,7 @@
           <a:p>
             <a:fld id="{846CE7D5-CF57-46EF-B807-FDD0502418D4}" type="datetimeFigureOut">
               <a:rPr lang="en-US" smtClean="0"/>
-              <a:t>1/10/2026</a:t>
+              <a:t>1/12/2026</a:t>
             </a:fld>
             <a:endParaRPr lang="en-US"/>
           </a:p>
@@ -4350,8 +4350,8 @@
         </p:nvSpPr>
         <p:spPr>
           <a:xfrm>
-            <a:off x="1247200" y="1422764"/>
-            <a:ext cx="738571" cy="461665"/>
+            <a:off x="1181437" y="1458772"/>
+            <a:ext cx="804334" cy="276999"/>
           </a:xfrm>
           <a:prstGeom prst="rect">
             <a:avLst/>
@@ -4371,13 +4371,6 @@
               <a:rPr lang="en-US" sz="1200" noProof="0" dirty="0"/>
               <a:t>GUI</a:t>
             </a:r>
-          </a:p>
-          <a:p>
-            <a:r>
-              <a:rPr lang="en-US" sz="1200" dirty="0"/>
-              <a:t>STT</a:t>
-            </a:r>
-            <a:endParaRPr lang="en-US" sz="1200" noProof="0" dirty="0"/>
           </a:p>
         </p:txBody>
       </p:sp>
@@ -4933,7 +4926,7 @@
             <a:pPr algn="ctr"/>
             <a:r>
               <a:rPr lang="en-US" sz="1200" u="sng" noProof="0" dirty="0"/>
-              <a:t>Hybrid voice assistant (TTS)</a:t>
+              <a:t>Hybrid voice assistant (TTS: VITS)</a:t>
             </a:r>
           </a:p>
         </p:txBody>
@@ -5692,6 +5685,44 @@
           </a:fontRef>
         </p:style>
       </p:cxnSp>
+      <p:sp>
+        <p:nvSpPr>
+          <p:cNvPr id="11" name="TextBox 92">
+            <a:extLst>
+              <a:ext uri="{FF2B5EF4-FFF2-40B4-BE49-F238E27FC236}">
+                <a16:creationId xmlns:a16="http://schemas.microsoft.com/office/drawing/2014/main" id="{4EEA2185-2E61-472B-6068-180910F67FDC}"/>
+              </a:ext>
+            </a:extLst>
+          </p:cNvPr>
+          <p:cNvSpPr txBox="1"/>
+          <p:nvPr/>
+        </p:nvSpPr>
+        <p:spPr>
+          <a:xfrm>
+            <a:off x="1195017" y="276999"/>
+            <a:ext cx="883260" cy="646331"/>
+          </a:xfrm>
+          <a:prstGeom prst="rect">
+            <a:avLst/>
+          </a:prstGeom>
+          <a:noFill/>
+        </p:spPr>
+        <p:txBody>
+          <a:bodyPr rot="0" spcFirstLastPara="0" vertOverflow="overflow" horzOverflow="overflow" vert="horz" wrap="square" lIns="91440" tIns="45720" rIns="91440" bIns="45720" numCol="1" spcCol="0" rtlCol="0" fromWordArt="0" anchor="t" anchorCtr="0" forceAA="0" compatLnSpc="1">
+            <a:prstTxWarp prst="textNoShape">
+              <a:avLst/>
+            </a:prstTxWarp>
+            <a:spAutoFit/>
+          </a:bodyPr>
+          <a:lstStyle/>
+          <a:p>
+            <a:r>
+              <a:rPr lang="en-US" sz="1200" noProof="0" dirty="0"/>
+              <a:t>Faster-Whisper (STT) </a:t>
+            </a:r>
+          </a:p>
+        </p:txBody>
+      </p:sp>
     </p:spTree>
     <p:extLst>
       <p:ext uri="{BB962C8B-B14F-4D97-AF65-F5344CB8AC3E}">

</xml_diff>

<commit_message>
added more descriptions and context, new architecture img
</commit_message>
<xml_diff>
--- a/images/framework_architecture.pptx
+++ b/images/framework_architecture.pptx
@@ -1231,7 +1231,7 @@
           <a:p>
             <a:fld id="{846CE7D5-CF57-46EF-B807-FDD0502418D4}" type="datetimeFigureOut">
               <a:rPr lang="en-US" smtClean="0"/>
-              <a:t>1/12/2026</a:t>
+              <a:t>1/28/2026</a:t>
             </a:fld>
             <a:endParaRPr lang="en-US"/>
           </a:p>
@@ -1399,7 +1399,7 @@
           <a:p>
             <a:fld id="{846CE7D5-CF57-46EF-B807-FDD0502418D4}" type="datetimeFigureOut">
               <a:rPr lang="en-US" smtClean="0"/>
-              <a:t>1/12/2026</a:t>
+              <a:t>1/28/2026</a:t>
             </a:fld>
             <a:endParaRPr lang="en-US"/>
           </a:p>
@@ -1577,7 +1577,7 @@
           <a:p>
             <a:fld id="{846CE7D5-CF57-46EF-B807-FDD0502418D4}" type="datetimeFigureOut">
               <a:rPr lang="en-US" smtClean="0"/>
-              <a:t>1/12/2026</a:t>
+              <a:t>1/28/2026</a:t>
             </a:fld>
             <a:endParaRPr lang="en-US"/>
           </a:p>
@@ -1745,7 +1745,7 @@
           <a:p>
             <a:fld id="{846CE7D5-CF57-46EF-B807-FDD0502418D4}" type="datetimeFigureOut">
               <a:rPr lang="en-US" smtClean="0"/>
-              <a:t>1/12/2026</a:t>
+              <a:t>1/28/2026</a:t>
             </a:fld>
             <a:endParaRPr lang="en-US"/>
           </a:p>
@@ -1990,7 +1990,7 @@
           <a:p>
             <a:fld id="{846CE7D5-CF57-46EF-B807-FDD0502418D4}" type="datetimeFigureOut">
               <a:rPr lang="en-US" smtClean="0"/>
-              <a:t>1/12/2026</a:t>
+              <a:t>1/28/2026</a:t>
             </a:fld>
             <a:endParaRPr lang="en-US"/>
           </a:p>
@@ -2219,7 +2219,7 @@
           <a:p>
             <a:fld id="{846CE7D5-CF57-46EF-B807-FDD0502418D4}" type="datetimeFigureOut">
               <a:rPr lang="en-US" smtClean="0"/>
-              <a:t>1/12/2026</a:t>
+              <a:t>1/28/2026</a:t>
             </a:fld>
             <a:endParaRPr lang="en-US"/>
           </a:p>
@@ -2583,7 +2583,7 @@
           <a:p>
             <a:fld id="{846CE7D5-CF57-46EF-B807-FDD0502418D4}" type="datetimeFigureOut">
               <a:rPr lang="en-US" smtClean="0"/>
-              <a:t>1/12/2026</a:t>
+              <a:t>1/28/2026</a:t>
             </a:fld>
             <a:endParaRPr lang="en-US"/>
           </a:p>
@@ -2700,7 +2700,7 @@
           <a:p>
             <a:fld id="{846CE7D5-CF57-46EF-B807-FDD0502418D4}" type="datetimeFigureOut">
               <a:rPr lang="en-US" smtClean="0"/>
-              <a:t>1/12/2026</a:t>
+              <a:t>1/28/2026</a:t>
             </a:fld>
             <a:endParaRPr lang="en-US"/>
           </a:p>
@@ -2795,7 +2795,7 @@
           <a:p>
             <a:fld id="{846CE7D5-CF57-46EF-B807-FDD0502418D4}" type="datetimeFigureOut">
               <a:rPr lang="en-US" smtClean="0"/>
-              <a:t>1/12/2026</a:t>
+              <a:t>1/28/2026</a:t>
             </a:fld>
             <a:endParaRPr lang="en-US"/>
           </a:p>
@@ -3070,7 +3070,7 @@
           <a:p>
             <a:fld id="{846CE7D5-CF57-46EF-B807-FDD0502418D4}" type="datetimeFigureOut">
               <a:rPr lang="en-US" smtClean="0"/>
-              <a:t>1/12/2026</a:t>
+              <a:t>1/28/2026</a:t>
             </a:fld>
             <a:endParaRPr lang="en-US"/>
           </a:p>
@@ -3325,7 +3325,7 @@
           <a:p>
             <a:fld id="{846CE7D5-CF57-46EF-B807-FDD0502418D4}" type="datetimeFigureOut">
               <a:rPr lang="en-US" smtClean="0"/>
-              <a:t>1/12/2026</a:t>
+              <a:t>1/28/2026</a:t>
             </a:fld>
             <a:endParaRPr lang="en-US"/>
           </a:p>
@@ -3536,7 +3536,7 @@
           <a:p>
             <a:fld id="{846CE7D5-CF57-46EF-B807-FDD0502418D4}" type="datetimeFigureOut">
               <a:rPr lang="en-US" smtClean="0"/>
-              <a:t>1/12/2026</a:t>
+              <a:t>1/28/2026</a:t>
             </a:fld>
             <a:endParaRPr lang="en-US"/>
           </a:p>
@@ -5175,9 +5175,7 @@
           </a:prstGeom>
           <a:ln>
             <a:solidFill>
-              <a:schemeClr val="bg2">
-                <a:lumMod val="50000"/>
-              </a:schemeClr>
+              <a:schemeClr val="accent1"/>
             </a:solidFill>
             <a:tailEnd type="triangle"/>
           </a:ln>
@@ -5221,9 +5219,7 @@
           </a:prstGeom>
           <a:ln>
             <a:solidFill>
-              <a:schemeClr val="bg2">
-                <a:lumMod val="50000"/>
-              </a:schemeClr>
+              <a:schemeClr val="accent2"/>
             </a:solidFill>
             <a:tailEnd type="triangle"/>
           </a:ln>
@@ -5258,7 +5254,7 @@
         <p:spPr>
           <a:xfrm>
             <a:off x="6275592" y="1328943"/>
-            <a:ext cx="835485" cy="246221"/>
+            <a:ext cx="771365" cy="246221"/>
           </a:xfrm>
           <a:prstGeom prst="rect">
             <a:avLst/>
@@ -5272,8 +5268,12 @@
           <a:lstStyle/>
           <a:p>
             <a:r>
-              <a:rPr lang="en-US" sz="1000" noProof="0" dirty="0"/>
-              <a:t>AI request? </a:t>
+              <a:rPr lang="en-US" sz="1000" noProof="0" dirty="0">
+                <a:solidFill>
+                  <a:schemeClr val="accent1"/>
+                </a:solidFill>
+              </a:rPr>
+              <a:t>AI request </a:t>
             </a:r>
           </a:p>
         </p:txBody>
@@ -5308,7 +5308,11 @@
           <a:p>
             <a:pPr algn="ctr"/>
             <a:r>
-              <a:rPr lang="en-US" sz="1000" noProof="0" dirty="0"/>
+              <a:rPr lang="en-US" sz="1000" noProof="0" dirty="0">
+                <a:solidFill>
+                  <a:schemeClr val="accent2"/>
+                </a:solidFill>
+              </a:rPr>
               <a:t>Direct navigation command </a:t>
             </a:r>
             <a:br>
@@ -5326,7 +5330,11 @@
               <a:rPr lang="en-US" sz="1000" noProof="0" dirty="0"/>
             </a:br>
             <a:r>
-              <a:rPr lang="en-US" sz="1000" noProof="0" dirty="0"/>
+              <a:rPr lang="en-US" sz="1000" noProof="0" dirty="0">
+                <a:solidFill>
+                  <a:schemeClr val="accent6"/>
+                </a:solidFill>
+              </a:rPr>
               <a:t>system status query?</a:t>
             </a:r>
           </a:p>
@@ -5723,6 +5731,297 @@
           </a:p>
         </p:txBody>
       </p:sp>
+      <p:sp>
+        <p:nvSpPr>
+          <p:cNvPr id="14" name="Pfeil: Fünfeck 13">
+            <a:extLst>
+              <a:ext uri="{FF2B5EF4-FFF2-40B4-BE49-F238E27FC236}">
+                <a16:creationId xmlns:a16="http://schemas.microsoft.com/office/drawing/2014/main" id="{651BDDBE-DF3A-704D-A42B-284378D125A2}"/>
+              </a:ext>
+            </a:extLst>
+          </p:cNvPr>
+          <p:cNvSpPr/>
+          <p:nvPr/>
+        </p:nvSpPr>
+        <p:spPr>
+          <a:xfrm>
+            <a:off x="0" y="3364648"/>
+            <a:ext cx="1422395" cy="715739"/>
+          </a:xfrm>
+          <a:prstGeom prst="homePlate">
+            <a:avLst/>
+          </a:prstGeom>
+          <a:noFill/>
+          <a:ln w="9525" cap="flat" cmpd="sng" algn="ctr">
+            <a:solidFill>
+              <a:schemeClr val="accent5"/>
+            </a:solidFill>
+            <a:prstDash val="solid"/>
+            <a:round/>
+            <a:headEnd type="none" w="med" len="med"/>
+            <a:tailEnd type="none" w="med" len="med"/>
+          </a:ln>
+        </p:spPr>
+        <p:style>
+          <a:lnRef idx="0">
+            <a:scrgbClr r="0" g="0" b="0"/>
+          </a:lnRef>
+          <a:fillRef idx="0">
+            <a:scrgbClr r="0" g="0" b="0"/>
+          </a:fillRef>
+          <a:effectRef idx="0">
+            <a:scrgbClr r="0" g="0" b="0"/>
+          </a:effectRef>
+          <a:fontRef idx="minor">
+            <a:schemeClr val="accent5"/>
+          </a:fontRef>
+        </p:style>
+        <p:txBody>
+          <a:bodyPr rtlCol="0" anchor="ctr"/>
+          <a:lstStyle/>
+          <a:p>
+            <a:pPr algn="ctr"/>
+            <a:endParaRPr lang="de-DE"/>
+          </a:p>
+        </p:txBody>
+      </p:sp>
+      <p:cxnSp>
+        <p:nvCxnSpPr>
+          <p:cNvPr id="20" name="Verbinder: gewinkelt 19">
+            <a:extLst>
+              <a:ext uri="{FF2B5EF4-FFF2-40B4-BE49-F238E27FC236}">
+                <a16:creationId xmlns:a16="http://schemas.microsoft.com/office/drawing/2014/main" id="{EA5F9F84-D0FC-119B-0A71-E45358E8B6A5}"/>
+              </a:ext>
+            </a:extLst>
+          </p:cNvPr>
+          <p:cNvCxnSpPr>
+            <a:stCxn id="14" idx="3"/>
+            <a:endCxn id="33" idx="1"/>
+          </p:cNvCxnSpPr>
+          <p:nvPr/>
+        </p:nvCxnSpPr>
+        <p:spPr>
+          <a:xfrm flipV="1">
+            <a:off x="1422395" y="1984987"/>
+            <a:ext cx="3425659" cy="1737531"/>
+          </a:xfrm>
+          <a:prstGeom prst="bentConnector3">
+            <a:avLst>
+              <a:gd name="adj1" fmla="val 99941"/>
+            </a:avLst>
+          </a:prstGeom>
+          <a:ln w="19050" cap="flat" cmpd="sng" algn="ctr">
+            <a:solidFill>
+              <a:schemeClr val="accent5"/>
+            </a:solidFill>
+            <a:prstDash val="lgDashDot"/>
+            <a:round/>
+            <a:headEnd type="none" w="med" len="med"/>
+            <a:tailEnd type="arrow" w="med" len="med"/>
+          </a:ln>
+        </p:spPr>
+        <p:style>
+          <a:lnRef idx="0">
+            <a:scrgbClr r="0" g="0" b="0"/>
+          </a:lnRef>
+          <a:fillRef idx="0">
+            <a:scrgbClr r="0" g="0" b="0"/>
+          </a:fillRef>
+          <a:effectRef idx="0">
+            <a:scrgbClr r="0" g="0" b="0"/>
+          </a:effectRef>
+          <a:fontRef idx="minor">
+            <a:schemeClr val="tx1"/>
+          </a:fontRef>
+        </p:style>
+      </p:cxnSp>
+      <p:sp>
+        <p:nvSpPr>
+          <p:cNvPr id="31" name="Textfeld 30">
+            <a:extLst>
+              <a:ext uri="{FF2B5EF4-FFF2-40B4-BE49-F238E27FC236}">
+                <a16:creationId xmlns:a16="http://schemas.microsoft.com/office/drawing/2014/main" id="{8DFBB3D3-1DED-BB27-CFAE-8F7EFE184FC7}"/>
+              </a:ext>
+            </a:extLst>
+          </p:cNvPr>
+          <p:cNvSpPr txBox="1"/>
+          <p:nvPr/>
+        </p:nvSpPr>
+        <p:spPr>
+          <a:xfrm>
+            <a:off x="4834544" y="3291904"/>
+            <a:ext cx="1404552" cy="400110"/>
+          </a:xfrm>
+          <a:prstGeom prst="rect">
+            <a:avLst/>
+          </a:prstGeom>
+          <a:noFill/>
+        </p:spPr>
+        <p:txBody>
+          <a:bodyPr wrap="none" rtlCol="0">
+            <a:spAutoFit/>
+          </a:bodyPr>
+          <a:lstStyle/>
+          <a:p>
+            <a:pPr algn="ctr"/>
+            <a:r>
+              <a:rPr lang="en-US" sz="1000" noProof="0" dirty="0">
+                <a:solidFill>
+                  <a:schemeClr val="accent5"/>
+                </a:solidFill>
+              </a:rPr>
+              <a:t>Conversation request </a:t>
+            </a:r>
+            <a:br>
+              <a:rPr lang="en-US" sz="1000" noProof="0" dirty="0">
+                <a:solidFill>
+                  <a:schemeClr val="accent5"/>
+                </a:solidFill>
+              </a:rPr>
+            </a:br>
+            <a:r>
+              <a:rPr lang="en-US" sz="1000" noProof="0" dirty="0">
+                <a:solidFill>
+                  <a:schemeClr val="accent5"/>
+                </a:solidFill>
+              </a:rPr>
+              <a:t>skips object detection</a:t>
+            </a:r>
+          </a:p>
+        </p:txBody>
+      </p:sp>
+      <p:cxnSp>
+        <p:nvCxnSpPr>
+          <p:cNvPr id="39" name="Gerade Verbindung mit Pfeil 38">
+            <a:extLst>
+              <a:ext uri="{FF2B5EF4-FFF2-40B4-BE49-F238E27FC236}">
+                <a16:creationId xmlns:a16="http://schemas.microsoft.com/office/drawing/2014/main" id="{6B3733A8-745E-C5A8-A2F5-3862534B708D}"/>
+              </a:ext>
+            </a:extLst>
+          </p:cNvPr>
+          <p:cNvCxnSpPr/>
+          <p:nvPr/>
+        </p:nvCxnSpPr>
+        <p:spPr>
+          <a:xfrm flipV="1">
+            <a:off x="5917463" y="1542614"/>
+            <a:ext cx="2395569" cy="321381"/>
+          </a:xfrm>
+          <a:prstGeom prst="straightConnector1">
+            <a:avLst/>
+          </a:prstGeom>
+          <a:ln>
+            <a:prstDash val="lgDashDot"/>
+            <a:tailEnd type="triangle"/>
+          </a:ln>
+        </p:spPr>
+        <p:style>
+          <a:lnRef idx="2">
+            <a:schemeClr val="accent5"/>
+          </a:lnRef>
+          <a:fillRef idx="0">
+            <a:schemeClr val="accent5"/>
+          </a:fillRef>
+          <a:effectRef idx="1">
+            <a:schemeClr val="accent5"/>
+          </a:effectRef>
+          <a:fontRef idx="minor">
+            <a:schemeClr val="tx1"/>
+          </a:fontRef>
+        </p:style>
+      </p:cxnSp>
+      <p:sp>
+        <p:nvSpPr>
+          <p:cNvPr id="40" name="Textfeld 39">
+            <a:extLst>
+              <a:ext uri="{FF2B5EF4-FFF2-40B4-BE49-F238E27FC236}">
+                <a16:creationId xmlns:a16="http://schemas.microsoft.com/office/drawing/2014/main" id="{3BF39E1F-09D5-518D-E07B-E8EA0B9B0DD4}"/>
+              </a:ext>
+            </a:extLst>
+          </p:cNvPr>
+          <p:cNvSpPr txBox="1"/>
+          <p:nvPr/>
+        </p:nvSpPr>
+        <p:spPr>
+          <a:xfrm>
+            <a:off x="6498292" y="1764468"/>
+            <a:ext cx="1277914" cy="246221"/>
+          </a:xfrm>
+          <a:prstGeom prst="rect">
+            <a:avLst/>
+          </a:prstGeom>
+          <a:noFill/>
+        </p:spPr>
+        <p:txBody>
+          <a:bodyPr wrap="none" rtlCol="0">
+            <a:spAutoFit/>
+          </a:bodyPr>
+          <a:lstStyle/>
+          <a:p>
+            <a:pPr algn="ctr"/>
+            <a:r>
+              <a:rPr lang="en-US" sz="1000" dirty="0">
+                <a:solidFill>
+                  <a:schemeClr val="accent5"/>
+                </a:solidFill>
+              </a:rPr>
+              <a:t>i</a:t>
+            </a:r>
+            <a:r>
+              <a:rPr lang="en-US" sz="1000" noProof="0" dirty="0">
+                <a:solidFill>
+                  <a:schemeClr val="accent5"/>
+                </a:solidFill>
+              </a:rPr>
+              <a:t>s always AI request</a:t>
+            </a:r>
+          </a:p>
+        </p:txBody>
+      </p:sp>
+      <p:cxnSp>
+        <p:nvCxnSpPr>
+          <p:cNvPr id="44" name="Gerade Verbindung mit Pfeil 43">
+            <a:extLst>
+              <a:ext uri="{FF2B5EF4-FFF2-40B4-BE49-F238E27FC236}">
+                <a16:creationId xmlns:a16="http://schemas.microsoft.com/office/drawing/2014/main" id="{B88F72E0-54C9-F813-7DA7-2F92E063DBF3}"/>
+              </a:ext>
+            </a:extLst>
+          </p:cNvPr>
+          <p:cNvCxnSpPr>
+            <a:cxnSpLocks/>
+          </p:cNvCxnSpPr>
+          <p:nvPr/>
+        </p:nvCxnSpPr>
+        <p:spPr>
+          <a:xfrm>
+            <a:off x="5904678" y="2124812"/>
+            <a:ext cx="2316192" cy="574489"/>
+          </a:xfrm>
+          <a:prstGeom prst="straightConnector1">
+            <a:avLst/>
+          </a:prstGeom>
+          <a:ln>
+            <a:solidFill>
+              <a:schemeClr val="accent6"/>
+            </a:solidFill>
+            <a:tailEnd type="triangle"/>
+          </a:ln>
+        </p:spPr>
+        <p:style>
+          <a:lnRef idx="2">
+            <a:schemeClr val="dk1"/>
+          </a:lnRef>
+          <a:fillRef idx="0">
+            <a:schemeClr val="dk1"/>
+          </a:fillRef>
+          <a:effectRef idx="1">
+            <a:schemeClr val="dk1"/>
+          </a:effectRef>
+          <a:fontRef idx="minor">
+            <a:schemeClr val="tx1"/>
+          </a:fontRef>
+        </p:style>
+      </p:cxnSp>
     </p:spTree>
     <p:extLst>
       <p:ext uri="{BB962C8B-B14F-4D97-AF65-F5344CB8AC3E}">

</xml_diff>